<commit_message>
added daa resource, cn tb, modified cn ppt and tb
</commit_message>
<xml_diff>
--- a/03. Computer Networks/PPTs/3.2. LSR, OSPF.pptx
+++ b/03. Computer Networks/PPTs/3.2. LSR, OSPF.pptx
@@ -4,6 +4,9 @@
   <p:sldMasterIdLst>
     <p:sldMasterId id="2147483648" r:id="rId1"/>
   </p:sldMasterIdLst>
+  <p:notesMasterIdLst>
+    <p:notesMasterId r:id="rId29"/>
+  </p:notesMasterIdLst>
   <p:sldIdLst>
     <p:sldId id="256" r:id="rId2"/>
     <p:sldId id="257" r:id="rId3"/>
@@ -17,20 +20,21 @@
     <p:sldId id="265" r:id="rId11"/>
     <p:sldId id="266" r:id="rId12"/>
     <p:sldId id="267" r:id="rId13"/>
-    <p:sldId id="268" r:id="rId14"/>
-    <p:sldId id="269" r:id="rId15"/>
-    <p:sldId id="270" r:id="rId16"/>
-    <p:sldId id="271" r:id="rId17"/>
-    <p:sldId id="272" r:id="rId18"/>
-    <p:sldId id="273" r:id="rId19"/>
-    <p:sldId id="274" r:id="rId20"/>
-    <p:sldId id="275" r:id="rId21"/>
-    <p:sldId id="276" r:id="rId22"/>
-    <p:sldId id="277" r:id="rId23"/>
-    <p:sldId id="278" r:id="rId24"/>
-    <p:sldId id="279" r:id="rId25"/>
-    <p:sldId id="280" r:id="rId26"/>
-    <p:sldId id="281" r:id="rId27"/>
+    <p:sldId id="283" r:id="rId14"/>
+    <p:sldId id="282" r:id="rId15"/>
+    <p:sldId id="284" r:id="rId16"/>
+    <p:sldId id="285" r:id="rId17"/>
+    <p:sldId id="286" r:id="rId18"/>
+    <p:sldId id="272" r:id="rId19"/>
+    <p:sldId id="273" r:id="rId20"/>
+    <p:sldId id="274" r:id="rId21"/>
+    <p:sldId id="275" r:id="rId22"/>
+    <p:sldId id="276" r:id="rId23"/>
+    <p:sldId id="277" r:id="rId24"/>
+    <p:sldId id="278" r:id="rId25"/>
+    <p:sldId id="279" r:id="rId26"/>
+    <p:sldId id="280" r:id="rId27"/>
+    <p:sldId id="281" r:id="rId28"/>
   </p:sldIdLst>
   <p:sldSz cx="9144000" cy="6858000" type="screen4x3"/>
   <p:notesSz cx="6858000" cy="9144000"/>
@@ -148,6 +152,440 @@
 </p:presentation>
 </file>
 
+<file path=ppt/notesMasters/notesMaster1.xml><?xml version="1.0" encoding="utf-8"?>
+<p:notesMaster xmlns:a="http://schemas.openxmlformats.org/drawingml/2006/main" xmlns:r="http://schemas.openxmlformats.org/officeDocument/2006/relationships" xmlns:p="http://schemas.openxmlformats.org/presentationml/2006/main">
+  <p:cSld>
+    <p:bg>
+      <p:bgRef idx="1001">
+        <a:schemeClr val="bg1"/>
+      </p:bgRef>
+    </p:bg>
+    <p:spTree>
+      <p:nvGrpSpPr>
+        <p:cNvPr id="1" name=""/>
+        <p:cNvGrpSpPr/>
+        <p:nvPr/>
+      </p:nvGrpSpPr>
+      <p:grpSpPr>
+        <a:xfrm>
+          <a:off x="0" y="0"/>
+          <a:ext cx="0" cy="0"/>
+          <a:chOff x="0" y="0"/>
+          <a:chExt cx="0" cy="0"/>
+        </a:xfrm>
+      </p:grpSpPr>
+      <p:sp>
+        <p:nvSpPr>
+          <p:cNvPr id="2" name="Header Placeholder 1"/>
+          <p:cNvSpPr>
+            <a:spLocks noGrp="1"/>
+          </p:cNvSpPr>
+          <p:nvPr>
+            <p:ph type="hdr" sz="quarter"/>
+          </p:nvPr>
+        </p:nvSpPr>
+        <p:spPr>
+          <a:xfrm>
+            <a:off x="0" y="0"/>
+            <a:ext cx="2971800" cy="458788"/>
+          </a:xfrm>
+          <a:prstGeom prst="rect">
+            <a:avLst/>
+          </a:prstGeom>
+        </p:spPr>
+        <p:txBody>
+          <a:bodyPr vert="horz" lIns="91440" tIns="45720" rIns="91440" bIns="45720" rtlCol="0"/>
+          <a:lstStyle>
+            <a:lvl1pPr algn="l">
+              <a:defRPr sz="1200"/>
+            </a:lvl1pPr>
+          </a:lstStyle>
+          <a:p>
+            <a:endParaRPr lang="en-IN"/>
+          </a:p>
+        </p:txBody>
+      </p:sp>
+      <p:sp>
+        <p:nvSpPr>
+          <p:cNvPr id="3" name="Date Placeholder 2"/>
+          <p:cNvSpPr>
+            <a:spLocks noGrp="1"/>
+          </p:cNvSpPr>
+          <p:nvPr>
+            <p:ph type="dt" idx="1"/>
+          </p:nvPr>
+        </p:nvSpPr>
+        <p:spPr>
+          <a:xfrm>
+            <a:off x="3884613" y="0"/>
+            <a:ext cx="2971800" cy="458788"/>
+          </a:xfrm>
+          <a:prstGeom prst="rect">
+            <a:avLst/>
+          </a:prstGeom>
+        </p:spPr>
+        <p:txBody>
+          <a:bodyPr vert="horz" lIns="91440" tIns="45720" rIns="91440" bIns="45720" rtlCol="0"/>
+          <a:lstStyle>
+            <a:lvl1pPr algn="r">
+              <a:defRPr sz="1200"/>
+            </a:lvl1pPr>
+          </a:lstStyle>
+          <a:p>
+            <a:fld id="{BAEF734D-E45F-4C10-A593-1BC5A73BE296}" type="datetimeFigureOut">
+              <a:rPr lang="en-IN" smtClean="0"/>
+              <a:t>23-04-2020</a:t>
+            </a:fld>
+            <a:endParaRPr lang="en-IN"/>
+          </a:p>
+        </p:txBody>
+      </p:sp>
+      <p:sp>
+        <p:nvSpPr>
+          <p:cNvPr id="4" name="Slide Image Placeholder 3"/>
+          <p:cNvSpPr>
+            <a:spLocks noGrp="1" noRot="1" noChangeAspect="1"/>
+          </p:cNvSpPr>
+          <p:nvPr>
+            <p:ph type="sldImg" idx="2"/>
+          </p:nvPr>
+        </p:nvSpPr>
+        <p:spPr>
+          <a:xfrm>
+            <a:off x="1371600" y="1143000"/>
+            <a:ext cx="4114800" cy="3086100"/>
+          </a:xfrm>
+          <a:prstGeom prst="rect">
+            <a:avLst/>
+          </a:prstGeom>
+          <a:noFill/>
+          <a:ln w="12700">
+            <a:solidFill>
+              <a:prstClr val="black"/>
+            </a:solidFill>
+          </a:ln>
+        </p:spPr>
+        <p:txBody>
+          <a:bodyPr vert="horz" lIns="91440" tIns="45720" rIns="91440" bIns="45720" rtlCol="0" anchor="ctr"/>
+          <a:lstStyle/>
+          <a:p>
+            <a:endParaRPr lang="en-IN"/>
+          </a:p>
+        </p:txBody>
+      </p:sp>
+      <p:sp>
+        <p:nvSpPr>
+          <p:cNvPr id="5" name="Notes Placeholder 4"/>
+          <p:cNvSpPr>
+            <a:spLocks noGrp="1"/>
+          </p:cNvSpPr>
+          <p:nvPr>
+            <p:ph type="body" sz="quarter" idx="3"/>
+          </p:nvPr>
+        </p:nvSpPr>
+        <p:spPr>
+          <a:xfrm>
+            <a:off x="685800" y="4400550"/>
+            <a:ext cx="5486400" cy="3600450"/>
+          </a:xfrm>
+          <a:prstGeom prst="rect">
+            <a:avLst/>
+          </a:prstGeom>
+        </p:spPr>
+        <p:txBody>
+          <a:bodyPr vert="horz" lIns="91440" tIns="45720" rIns="91440" bIns="45720" rtlCol="0"/>
+          <a:lstStyle/>
+          <a:p>
+            <a:pPr lvl="0"/>
+            <a:r>
+              <a:rPr lang="en-US"/>
+              <a:t>Click to edit Master text styles</a:t>
+            </a:r>
+          </a:p>
+          <a:p>
+            <a:pPr lvl="1"/>
+            <a:r>
+              <a:rPr lang="en-US"/>
+              <a:t>Second level</a:t>
+            </a:r>
+          </a:p>
+          <a:p>
+            <a:pPr lvl="2"/>
+            <a:r>
+              <a:rPr lang="en-US"/>
+              <a:t>Third level</a:t>
+            </a:r>
+          </a:p>
+          <a:p>
+            <a:pPr lvl="3"/>
+            <a:r>
+              <a:rPr lang="en-US"/>
+              <a:t>Fourth level</a:t>
+            </a:r>
+          </a:p>
+          <a:p>
+            <a:pPr lvl="4"/>
+            <a:r>
+              <a:rPr lang="en-US"/>
+              <a:t>Fifth level</a:t>
+            </a:r>
+            <a:endParaRPr lang="en-IN"/>
+          </a:p>
+        </p:txBody>
+      </p:sp>
+      <p:sp>
+        <p:nvSpPr>
+          <p:cNvPr id="6" name="Footer Placeholder 5"/>
+          <p:cNvSpPr>
+            <a:spLocks noGrp="1"/>
+          </p:cNvSpPr>
+          <p:nvPr>
+            <p:ph type="ftr" sz="quarter" idx="4"/>
+          </p:nvPr>
+        </p:nvSpPr>
+        <p:spPr>
+          <a:xfrm>
+            <a:off x="0" y="8685213"/>
+            <a:ext cx="2971800" cy="458787"/>
+          </a:xfrm>
+          <a:prstGeom prst="rect">
+            <a:avLst/>
+          </a:prstGeom>
+        </p:spPr>
+        <p:txBody>
+          <a:bodyPr vert="horz" lIns="91440" tIns="45720" rIns="91440" bIns="45720" rtlCol="0" anchor="b"/>
+          <a:lstStyle>
+            <a:lvl1pPr algn="l">
+              <a:defRPr sz="1200"/>
+            </a:lvl1pPr>
+          </a:lstStyle>
+          <a:p>
+            <a:endParaRPr lang="en-IN"/>
+          </a:p>
+        </p:txBody>
+      </p:sp>
+      <p:sp>
+        <p:nvSpPr>
+          <p:cNvPr id="7" name="Slide Number Placeholder 6"/>
+          <p:cNvSpPr>
+            <a:spLocks noGrp="1"/>
+          </p:cNvSpPr>
+          <p:nvPr>
+            <p:ph type="sldNum" sz="quarter" idx="5"/>
+          </p:nvPr>
+        </p:nvSpPr>
+        <p:spPr>
+          <a:xfrm>
+            <a:off x="3884613" y="8685213"/>
+            <a:ext cx="2971800" cy="458787"/>
+          </a:xfrm>
+          <a:prstGeom prst="rect">
+            <a:avLst/>
+          </a:prstGeom>
+        </p:spPr>
+        <p:txBody>
+          <a:bodyPr vert="horz" lIns="91440" tIns="45720" rIns="91440" bIns="45720" rtlCol="0" anchor="b"/>
+          <a:lstStyle>
+            <a:lvl1pPr algn="r">
+              <a:defRPr sz="1200"/>
+            </a:lvl1pPr>
+          </a:lstStyle>
+          <a:p>
+            <a:fld id="{030ECCA5-61B1-4D0E-B8EF-B61A31BB9669}" type="slidenum">
+              <a:rPr lang="en-IN" smtClean="0"/>
+              <a:t>‹#›</a:t>
+            </a:fld>
+            <a:endParaRPr lang="en-IN"/>
+          </a:p>
+        </p:txBody>
+      </p:sp>
+    </p:spTree>
+    <p:extLst>
+      <p:ext uri="{BB962C8B-B14F-4D97-AF65-F5344CB8AC3E}">
+        <p14:creationId xmlns:p14="http://schemas.microsoft.com/office/powerpoint/2010/main" val="2538718416"/>
+      </p:ext>
+    </p:extLst>
+  </p:cSld>
+  <p:clrMap bg1="lt1" tx1="dk1" bg2="lt2" tx2="dk2" accent1="accent1" accent2="accent2" accent3="accent3" accent4="accent4" accent5="accent5" accent6="accent6" hlink="hlink" folHlink="folHlink"/>
+  <p:notesStyle>
+    <a:lvl1pPr marL="0" algn="l" defTabSz="914400" rtl="0" eaLnBrk="1" latinLnBrk="0" hangingPunct="1">
+      <a:defRPr sz="1200" kern="1200">
+        <a:solidFill>
+          <a:schemeClr val="tx1"/>
+        </a:solidFill>
+        <a:latin typeface="+mn-lt"/>
+        <a:ea typeface="+mn-ea"/>
+        <a:cs typeface="+mn-cs"/>
+      </a:defRPr>
+    </a:lvl1pPr>
+    <a:lvl2pPr marL="457200" algn="l" defTabSz="914400" rtl="0" eaLnBrk="1" latinLnBrk="0" hangingPunct="1">
+      <a:defRPr sz="1200" kern="1200">
+        <a:solidFill>
+          <a:schemeClr val="tx1"/>
+        </a:solidFill>
+        <a:latin typeface="+mn-lt"/>
+        <a:ea typeface="+mn-ea"/>
+        <a:cs typeface="+mn-cs"/>
+      </a:defRPr>
+    </a:lvl2pPr>
+    <a:lvl3pPr marL="914400" algn="l" defTabSz="914400" rtl="0" eaLnBrk="1" latinLnBrk="0" hangingPunct="1">
+      <a:defRPr sz="1200" kern="1200">
+        <a:solidFill>
+          <a:schemeClr val="tx1"/>
+        </a:solidFill>
+        <a:latin typeface="+mn-lt"/>
+        <a:ea typeface="+mn-ea"/>
+        <a:cs typeface="+mn-cs"/>
+      </a:defRPr>
+    </a:lvl3pPr>
+    <a:lvl4pPr marL="1371600" algn="l" defTabSz="914400" rtl="0" eaLnBrk="1" latinLnBrk="0" hangingPunct="1">
+      <a:defRPr sz="1200" kern="1200">
+        <a:solidFill>
+          <a:schemeClr val="tx1"/>
+        </a:solidFill>
+        <a:latin typeface="+mn-lt"/>
+        <a:ea typeface="+mn-ea"/>
+        <a:cs typeface="+mn-cs"/>
+      </a:defRPr>
+    </a:lvl4pPr>
+    <a:lvl5pPr marL="1828800" algn="l" defTabSz="914400" rtl="0" eaLnBrk="1" latinLnBrk="0" hangingPunct="1">
+      <a:defRPr sz="1200" kern="1200">
+        <a:solidFill>
+          <a:schemeClr val="tx1"/>
+        </a:solidFill>
+        <a:latin typeface="+mn-lt"/>
+        <a:ea typeface="+mn-ea"/>
+        <a:cs typeface="+mn-cs"/>
+      </a:defRPr>
+    </a:lvl5pPr>
+    <a:lvl6pPr marL="2286000" algn="l" defTabSz="914400" rtl="0" eaLnBrk="1" latinLnBrk="0" hangingPunct="1">
+      <a:defRPr sz="1200" kern="1200">
+        <a:solidFill>
+          <a:schemeClr val="tx1"/>
+        </a:solidFill>
+        <a:latin typeface="+mn-lt"/>
+        <a:ea typeface="+mn-ea"/>
+        <a:cs typeface="+mn-cs"/>
+      </a:defRPr>
+    </a:lvl6pPr>
+    <a:lvl7pPr marL="2743200" algn="l" defTabSz="914400" rtl="0" eaLnBrk="1" latinLnBrk="0" hangingPunct="1">
+      <a:defRPr sz="1200" kern="1200">
+        <a:solidFill>
+          <a:schemeClr val="tx1"/>
+        </a:solidFill>
+        <a:latin typeface="+mn-lt"/>
+        <a:ea typeface="+mn-ea"/>
+        <a:cs typeface="+mn-cs"/>
+      </a:defRPr>
+    </a:lvl7pPr>
+    <a:lvl8pPr marL="3200400" algn="l" defTabSz="914400" rtl="0" eaLnBrk="1" latinLnBrk="0" hangingPunct="1">
+      <a:defRPr sz="1200" kern="1200">
+        <a:solidFill>
+          <a:schemeClr val="tx1"/>
+        </a:solidFill>
+        <a:latin typeface="+mn-lt"/>
+        <a:ea typeface="+mn-ea"/>
+        <a:cs typeface="+mn-cs"/>
+      </a:defRPr>
+    </a:lvl8pPr>
+    <a:lvl9pPr marL="3657600" algn="l" defTabSz="914400" rtl="0" eaLnBrk="1" latinLnBrk="0" hangingPunct="1">
+      <a:defRPr sz="1200" kern="1200">
+        <a:solidFill>
+          <a:schemeClr val="tx1"/>
+        </a:solidFill>
+        <a:latin typeface="+mn-lt"/>
+        <a:ea typeface="+mn-ea"/>
+        <a:cs typeface="+mn-cs"/>
+      </a:defRPr>
+    </a:lvl9pPr>
+  </p:notesStyle>
+</p:notesMaster>
+</file>
+
+<file path=ppt/notesSlides/notesSlide1.xml><?xml version="1.0" encoding="utf-8"?>
+<p:notes xmlns:a="http://schemas.openxmlformats.org/drawingml/2006/main" xmlns:r="http://schemas.openxmlformats.org/officeDocument/2006/relationships" xmlns:p="http://schemas.openxmlformats.org/presentationml/2006/main">
+  <p:cSld>
+    <p:spTree>
+      <p:nvGrpSpPr>
+        <p:cNvPr id="1" name=""/>
+        <p:cNvGrpSpPr/>
+        <p:nvPr/>
+      </p:nvGrpSpPr>
+      <p:grpSpPr>
+        <a:xfrm>
+          <a:off x="0" y="0"/>
+          <a:ext cx="0" cy="0"/>
+          <a:chOff x="0" y="0"/>
+          <a:chExt cx="0" cy="0"/>
+        </a:xfrm>
+      </p:grpSpPr>
+      <p:sp>
+        <p:nvSpPr>
+          <p:cNvPr id="2" name="Slide Image Placeholder 1"/>
+          <p:cNvSpPr>
+            <a:spLocks noGrp="1" noRot="1" noChangeAspect="1"/>
+          </p:cNvSpPr>
+          <p:nvPr>
+            <p:ph type="sldImg"/>
+          </p:nvPr>
+        </p:nvSpPr>
+        <p:spPr/>
+      </p:sp>
+      <p:sp>
+        <p:nvSpPr>
+          <p:cNvPr id="3" name="Notes Placeholder 2"/>
+          <p:cNvSpPr>
+            <a:spLocks noGrp="1"/>
+          </p:cNvSpPr>
+          <p:nvPr>
+            <p:ph type="body" idx="1"/>
+          </p:nvPr>
+        </p:nvSpPr>
+        <p:spPr/>
+        <p:txBody>
+          <a:bodyPr/>
+          <a:lstStyle/>
+          <a:p>
+            <a:endParaRPr lang="en-IN" dirty="0"/>
+          </a:p>
+        </p:txBody>
+      </p:sp>
+      <p:sp>
+        <p:nvSpPr>
+          <p:cNvPr id="4" name="Slide Number Placeholder 3"/>
+          <p:cNvSpPr>
+            <a:spLocks noGrp="1"/>
+          </p:cNvSpPr>
+          <p:nvPr>
+            <p:ph type="sldNum" sz="quarter" idx="5"/>
+          </p:nvPr>
+        </p:nvSpPr>
+        <p:spPr/>
+        <p:txBody>
+          <a:bodyPr/>
+          <a:lstStyle/>
+          <a:p>
+            <a:fld id="{030ECCA5-61B1-4D0E-B8EF-B61A31BB9669}" type="slidenum">
+              <a:rPr lang="en-IN" smtClean="0"/>
+              <a:t>9</a:t>
+            </a:fld>
+            <a:endParaRPr lang="en-IN"/>
+          </a:p>
+        </p:txBody>
+      </p:sp>
+    </p:spTree>
+    <p:extLst>
+      <p:ext uri="{BB962C8B-B14F-4D97-AF65-F5344CB8AC3E}">
+        <p14:creationId xmlns:p14="http://schemas.microsoft.com/office/powerpoint/2010/main" val="4212587092"/>
+      </p:ext>
+    </p:extLst>
+  </p:cSld>
+  <p:clrMapOvr>
+    <a:masterClrMapping/>
+  </p:clrMapOvr>
+</p:notes>
+</file>
+
 <file path=ppt/slideLayouts/slideLayout1.xml><?xml version="1.0" encoding="utf-8"?>
 <p:sldLayout xmlns:a="http://schemas.openxmlformats.org/drawingml/2006/main" xmlns:r="http://schemas.openxmlformats.org/officeDocument/2006/relationships" xmlns:p="http://schemas.openxmlformats.org/presentationml/2006/main" type="title" preserve="1">
   <p:cSld name="Title Slide">
@@ -328,7 +766,7 @@
             <a:fld id="{1D8BD707-D9CF-40AE-B4C6-C98DA3205C09}" type="datetimeFigureOut">
               <a:rPr lang="en-US" smtClean="0"/>
               <a:pPr/>
-              <a:t>4/20/2020</a:t>
+              <a:t>4/23/2020</a:t>
             </a:fld>
             <a:endParaRPr lang="en-US"/>
           </a:p>
@@ -493,7 +931,7 @@
             <a:fld id="{1D8BD707-D9CF-40AE-B4C6-C98DA3205C09}" type="datetimeFigureOut">
               <a:rPr lang="en-US" smtClean="0"/>
               <a:pPr/>
-              <a:t>4/20/2020</a:t>
+              <a:t>4/23/2020</a:t>
             </a:fld>
             <a:endParaRPr lang="en-US"/>
           </a:p>
@@ -668,7 +1106,7 @@
             <a:fld id="{1D8BD707-D9CF-40AE-B4C6-C98DA3205C09}" type="datetimeFigureOut">
               <a:rPr lang="en-US" smtClean="0"/>
               <a:pPr/>
-              <a:t>4/20/2020</a:t>
+              <a:t>4/23/2020</a:t>
             </a:fld>
             <a:endParaRPr lang="en-US"/>
           </a:p>
@@ -849,7 +1287,7 @@
             <a:fld id="{1D8BD707-D9CF-40AE-B4C6-C98DA3205C09}" type="datetimeFigureOut">
               <a:rPr lang="en-US" smtClean="0"/>
               <a:pPr/>
-              <a:t>4/20/2020</a:t>
+              <a:t>4/23/2020</a:t>
             </a:fld>
             <a:endParaRPr lang="en-US"/>
           </a:p>
@@ -1091,7 +1529,7 @@
             <a:fld id="{1D8BD707-D9CF-40AE-B4C6-C98DA3205C09}" type="datetimeFigureOut">
               <a:rPr lang="en-US" smtClean="0"/>
               <a:pPr/>
-              <a:t>4/20/2020</a:t>
+              <a:t>4/23/2020</a:t>
             </a:fld>
             <a:endParaRPr lang="en-US"/>
           </a:p>
@@ -1373,7 +1811,7 @@
             <a:fld id="{1D8BD707-D9CF-40AE-B4C6-C98DA3205C09}" type="datetimeFigureOut">
               <a:rPr lang="en-US" smtClean="0"/>
               <a:pPr/>
-              <a:t>4/20/2020</a:t>
+              <a:t>4/23/2020</a:t>
             </a:fld>
             <a:endParaRPr lang="en-US"/>
           </a:p>
@@ -1789,7 +2227,7 @@
             <a:fld id="{1D8BD707-D9CF-40AE-B4C6-C98DA3205C09}" type="datetimeFigureOut">
               <a:rPr lang="en-US" smtClean="0"/>
               <a:pPr/>
-              <a:t>4/20/2020</a:t>
+              <a:t>4/23/2020</a:t>
             </a:fld>
             <a:endParaRPr lang="en-US"/>
           </a:p>
@@ -1903,7 +2341,7 @@
             <a:fld id="{1D8BD707-D9CF-40AE-B4C6-C98DA3205C09}" type="datetimeFigureOut">
               <a:rPr lang="en-US" smtClean="0"/>
               <a:pPr/>
-              <a:t>4/20/2020</a:t>
+              <a:t>4/23/2020</a:t>
             </a:fld>
             <a:endParaRPr lang="en-US"/>
           </a:p>
@@ -1995,7 +2433,7 @@
             <a:fld id="{1D8BD707-D9CF-40AE-B4C6-C98DA3205C09}" type="datetimeFigureOut">
               <a:rPr lang="en-US" smtClean="0"/>
               <a:pPr/>
-              <a:t>4/20/2020</a:t>
+              <a:t>4/23/2020</a:t>
             </a:fld>
             <a:endParaRPr lang="en-US"/>
           </a:p>
@@ -2267,7 +2705,7 @@
             <a:fld id="{1D8BD707-D9CF-40AE-B4C6-C98DA3205C09}" type="datetimeFigureOut">
               <a:rPr lang="en-US" smtClean="0"/>
               <a:pPr/>
-              <a:t>4/20/2020</a:t>
+              <a:t>4/23/2020</a:t>
             </a:fld>
             <a:endParaRPr lang="en-US"/>
           </a:p>
@@ -2516,7 +2954,7 @@
             <a:fld id="{1D8BD707-D9CF-40AE-B4C6-C98DA3205C09}" type="datetimeFigureOut">
               <a:rPr lang="en-US" smtClean="0"/>
               <a:pPr/>
-              <a:t>4/20/2020</a:t>
+              <a:t>4/23/2020</a:t>
             </a:fld>
             <a:endParaRPr lang="en-US"/>
           </a:p>
@@ -2724,7 +3162,7 @@
             <a:fld id="{1D8BD707-D9CF-40AE-B4C6-C98DA3205C09}" type="datetimeFigureOut">
               <a:rPr lang="en-US" smtClean="0"/>
               <a:pPr/>
-              <a:t>4/20/2020</a:t>
+              <a:t>4/23/2020</a:t>
             </a:fld>
             <a:endParaRPr lang="en-US"/>
           </a:p>
@@ -3257,7 +3695,10 @@
           <a:bodyPr/>
           <a:lstStyle/>
           <a:p>
-            <a:endParaRPr lang="en-US"/>
+            <a:r>
+              <a:rPr lang="en-US" dirty="0"/>
+              <a:t>a</a:t>
+            </a:r>
           </a:p>
         </p:txBody>
       </p:sp>
@@ -3401,18 +3842,13 @@
           <a:p>
             <a:r>
               <a:rPr lang="en-US" dirty="0"/>
-              <a:t>Each node uses the shortest path tree protocol to construct its </a:t>
-            </a:r>
-            <a:r>
-              <a:rPr lang="en-US"/>
-              <a:t>routing table. </a:t>
-            </a:r>
-            <a:endParaRPr lang="en-US" dirty="0"/>
+              <a:t>Each node uses the shortest path tree protocol to construct its routing table. </a:t>
+            </a:r>
           </a:p>
           <a:p>
             <a:r>
               <a:rPr lang="en-US" dirty="0"/>
-              <a:t>The routing table shows the cost of reaching each node to root.</a:t>
+              <a:t>The routing table shows the cost of reaching each node from the root.</a:t>
             </a:r>
           </a:p>
         </p:txBody>
@@ -3488,15 +3924,569 @@
           <a:chExt cx="0" cy="0"/>
         </a:xfrm>
       </p:grpSpPr>
+      <p:sp>
+        <p:nvSpPr>
+          <p:cNvPr id="4" name="Title 3">
+            <a:extLst>
+              <a:ext uri="{FF2B5EF4-FFF2-40B4-BE49-F238E27FC236}">
+                <a16:creationId xmlns:a16="http://schemas.microsoft.com/office/drawing/2014/main" id="{44CACD06-DE0B-4140-9E86-635074D5724E}"/>
+              </a:ext>
+            </a:extLst>
+          </p:cNvPr>
+          <p:cNvSpPr>
+            <a:spLocks noGrp="1"/>
+          </p:cNvSpPr>
+          <p:nvPr>
+            <p:ph type="title"/>
+          </p:nvPr>
+        </p:nvSpPr>
+        <p:spPr>
+          <a:xfrm>
+            <a:off x="457200" y="2438400"/>
+            <a:ext cx="8229600" cy="1143000"/>
+          </a:xfrm>
+        </p:spPr>
+        <p:txBody>
+          <a:bodyPr/>
+          <a:lstStyle/>
+          <a:p>
+            <a:r>
+              <a:rPr lang="en-IN" dirty="0"/>
+              <a:t>OSPF</a:t>
+            </a:r>
+          </a:p>
+        </p:txBody>
+      </p:sp>
+    </p:spTree>
+    <p:extLst>
+      <p:ext uri="{BB962C8B-B14F-4D97-AF65-F5344CB8AC3E}">
+        <p14:creationId xmlns:p14="http://schemas.microsoft.com/office/powerpoint/2010/main" val="3021442100"/>
+      </p:ext>
+    </p:extLst>
+  </p:cSld>
+  <p:clrMapOvr>
+    <a:masterClrMapping/>
+  </p:clrMapOvr>
+</p:sld>
+</file>
+
+<file path=ppt/slides/slide14.xml><?xml version="1.0" encoding="utf-8"?>
+<p:sld xmlns:a="http://schemas.openxmlformats.org/drawingml/2006/main" xmlns:r="http://schemas.openxmlformats.org/officeDocument/2006/relationships" xmlns:p="http://schemas.openxmlformats.org/presentationml/2006/main">
+  <p:cSld>
+    <p:spTree>
+      <p:nvGrpSpPr>
+        <p:cNvPr id="1" name=""/>
+        <p:cNvGrpSpPr/>
+        <p:nvPr/>
+      </p:nvGrpSpPr>
+      <p:grpSpPr>
+        <a:xfrm>
+          <a:off x="0" y="0"/>
+          <a:ext cx="0" cy="0"/>
+          <a:chOff x="0" y="0"/>
+          <a:chExt cx="0" cy="0"/>
+        </a:xfrm>
+      </p:grpSpPr>
+      <p:sp>
+        <p:nvSpPr>
+          <p:cNvPr id="2" name="Title 1">
+            <a:extLst>
+              <a:ext uri="{FF2B5EF4-FFF2-40B4-BE49-F238E27FC236}">
+                <a16:creationId xmlns:a16="http://schemas.microsoft.com/office/drawing/2014/main" id="{CC66EB5F-A430-4E09-8B03-20843F3EE790}"/>
+              </a:ext>
+            </a:extLst>
+          </p:cNvPr>
+          <p:cNvSpPr>
+            <a:spLocks noGrp="1"/>
+          </p:cNvSpPr>
+          <p:nvPr>
+            <p:ph type="title"/>
+          </p:nvPr>
+        </p:nvSpPr>
+        <p:spPr>
+          <a:xfrm>
+            <a:off x="469777" y="228600"/>
+            <a:ext cx="8229600" cy="1143000"/>
+          </a:xfrm>
+        </p:spPr>
+        <p:txBody>
+          <a:bodyPr/>
+          <a:lstStyle/>
+          <a:p>
+            <a:r>
+              <a:rPr lang="en-IN" dirty="0"/>
+              <a:t>OSPF</a:t>
+            </a:r>
+          </a:p>
+        </p:txBody>
+      </p:sp>
+      <p:sp>
+        <p:nvSpPr>
+          <p:cNvPr id="3" name="Content Placeholder 2">
+            <a:extLst>
+              <a:ext uri="{FF2B5EF4-FFF2-40B4-BE49-F238E27FC236}">
+                <a16:creationId xmlns:a16="http://schemas.microsoft.com/office/drawing/2014/main" id="{FCD7086D-FCD6-4315-9D1E-D2B7600D8C0F}"/>
+              </a:ext>
+            </a:extLst>
+          </p:cNvPr>
+          <p:cNvSpPr>
+            <a:spLocks noGrp="1"/>
+          </p:cNvSpPr>
+          <p:nvPr>
+            <p:ph idx="1"/>
+          </p:nvPr>
+        </p:nvSpPr>
+        <p:spPr/>
+        <p:txBody>
+          <a:bodyPr/>
+          <a:lstStyle/>
+          <a:p>
+            <a:r>
+              <a:rPr lang="en-IN" dirty="0"/>
+              <a:t>OSPF Open Shortest Path First is a link-state routing protocol that was developed in 1991. </a:t>
+            </a:r>
+          </a:p>
+          <a:p>
+            <a:r>
+              <a:rPr lang="en-IN" dirty="0"/>
+              <a:t>It is an intradomain routing protocol based on link-state routing. </a:t>
+            </a:r>
+          </a:p>
+          <a:p>
+            <a:r>
+              <a:rPr lang="en-IN" dirty="0"/>
+              <a:t>OSPF was a replacement for distance vector routing protocol RIP. </a:t>
+            </a:r>
+          </a:p>
+          <a:p>
+            <a:r>
+              <a:rPr lang="en-IN" dirty="0"/>
+              <a:t>Based on Bellman-Ford Algorithm. </a:t>
+            </a:r>
+          </a:p>
+          <a:p>
+            <a:r>
+              <a:rPr lang="en-IN" dirty="0"/>
+              <a:t>Worked well in small systems. </a:t>
+            </a:r>
+          </a:p>
+          <a:p>
+            <a:endParaRPr lang="en-IN" dirty="0"/>
+          </a:p>
+        </p:txBody>
+      </p:sp>
+    </p:spTree>
+    <p:extLst>
+      <p:ext uri="{BB962C8B-B14F-4D97-AF65-F5344CB8AC3E}">
+        <p14:creationId xmlns:p14="http://schemas.microsoft.com/office/powerpoint/2010/main" val="598040285"/>
+      </p:ext>
+    </p:extLst>
+  </p:cSld>
+  <p:clrMapOvr>
+    <a:masterClrMapping/>
+  </p:clrMapOvr>
+</p:sld>
+</file>
+
+<file path=ppt/slides/slide15.xml><?xml version="1.0" encoding="utf-8"?>
+<p:sld xmlns:a="http://schemas.openxmlformats.org/drawingml/2006/main" xmlns:r="http://schemas.openxmlformats.org/officeDocument/2006/relationships" xmlns:p="http://schemas.openxmlformats.org/presentationml/2006/main">
+  <p:cSld>
+    <p:spTree>
+      <p:nvGrpSpPr>
+        <p:cNvPr id="1" name=""/>
+        <p:cNvGrpSpPr/>
+        <p:nvPr/>
+      </p:nvGrpSpPr>
+      <p:grpSpPr>
+        <a:xfrm>
+          <a:off x="0" y="0"/>
+          <a:ext cx="0" cy="0"/>
+          <a:chOff x="0" y="0"/>
+          <a:chExt cx="0" cy="0"/>
+        </a:xfrm>
+      </p:grpSpPr>
+      <p:sp>
+        <p:nvSpPr>
+          <p:cNvPr id="2" name="Title 1">
+            <a:extLst>
+              <a:ext uri="{FF2B5EF4-FFF2-40B4-BE49-F238E27FC236}">
+                <a16:creationId xmlns:a16="http://schemas.microsoft.com/office/drawing/2014/main" id="{44C83C06-3F01-4D18-A7E4-1C69EC477C19}"/>
+              </a:ext>
+            </a:extLst>
+          </p:cNvPr>
+          <p:cNvSpPr>
+            <a:spLocks noGrp="1"/>
+          </p:cNvSpPr>
+          <p:nvPr>
+            <p:ph type="title"/>
+          </p:nvPr>
+        </p:nvSpPr>
+        <p:spPr/>
+        <p:txBody>
+          <a:bodyPr/>
+          <a:lstStyle/>
+          <a:p>
+            <a:r>
+              <a:rPr lang="en-IN" dirty="0"/>
+              <a:t>Areas</a:t>
+            </a:r>
+          </a:p>
+        </p:txBody>
+      </p:sp>
+      <p:sp>
+        <p:nvSpPr>
+          <p:cNvPr id="3" name="Content Placeholder 2">
+            <a:extLst>
+              <a:ext uri="{FF2B5EF4-FFF2-40B4-BE49-F238E27FC236}">
+                <a16:creationId xmlns:a16="http://schemas.microsoft.com/office/drawing/2014/main" id="{DB364A38-F3E3-4E3C-8CA6-987A2D460286}"/>
+              </a:ext>
+            </a:extLst>
+          </p:cNvPr>
+          <p:cNvSpPr>
+            <a:spLocks noGrp="1"/>
+          </p:cNvSpPr>
+          <p:nvPr>
+            <p:ph idx="1"/>
+          </p:nvPr>
+        </p:nvSpPr>
+        <p:spPr/>
+        <p:txBody>
+          <a:bodyPr/>
+          <a:lstStyle/>
+          <a:p>
+            <a:r>
+              <a:rPr lang="en-US" dirty="0"/>
+              <a:t>An OSPF network can be divided into sub-domains called </a:t>
+            </a:r>
+            <a:r>
+              <a:rPr lang="en-US" b="1" dirty="0"/>
+              <a:t>areas</a:t>
+            </a:r>
+            <a:r>
+              <a:rPr lang="en-US" dirty="0"/>
+              <a:t>.</a:t>
+            </a:r>
+          </a:p>
+          <a:p>
+            <a:r>
+              <a:rPr lang="en-US" dirty="0"/>
+              <a:t>An area is a logical collection of OSPF networks, routers, and links that have the same area identification.</a:t>
+            </a:r>
+          </a:p>
+          <a:p>
+            <a:r>
+              <a:rPr lang="en-US" dirty="0"/>
+              <a:t>Areas limit the scope of route information distribution. It is not possible to do route update filtering within an area.</a:t>
+            </a:r>
+            <a:endParaRPr lang="en-IN" dirty="0"/>
+          </a:p>
+        </p:txBody>
+      </p:sp>
+    </p:spTree>
+    <p:extLst>
+      <p:ext uri="{BB962C8B-B14F-4D97-AF65-F5344CB8AC3E}">
+        <p14:creationId xmlns:p14="http://schemas.microsoft.com/office/powerpoint/2010/main" val="1035971368"/>
+      </p:ext>
+    </p:extLst>
+  </p:cSld>
+  <p:clrMapOvr>
+    <a:masterClrMapping/>
+  </p:clrMapOvr>
+</p:sld>
+</file>
+
+<file path=ppt/slides/slide16.xml><?xml version="1.0" encoding="utf-8"?>
+<p:sld xmlns:a="http://schemas.openxmlformats.org/drawingml/2006/main" xmlns:r="http://schemas.openxmlformats.org/officeDocument/2006/relationships" xmlns:p="http://schemas.openxmlformats.org/presentationml/2006/main">
+  <p:cSld>
+    <p:spTree>
+      <p:nvGrpSpPr>
+        <p:cNvPr id="1" name=""/>
+        <p:cNvGrpSpPr/>
+        <p:nvPr/>
+      </p:nvGrpSpPr>
+      <p:grpSpPr>
+        <a:xfrm>
+          <a:off x="0" y="0"/>
+          <a:ext cx="0" cy="0"/>
+          <a:chOff x="0" y="0"/>
+          <a:chExt cx="0" cy="0"/>
+        </a:xfrm>
+      </p:grpSpPr>
+      <p:sp>
+        <p:nvSpPr>
+          <p:cNvPr id="3" name="Content Placeholder 2">
+            <a:extLst>
+              <a:ext uri="{FF2B5EF4-FFF2-40B4-BE49-F238E27FC236}">
+                <a16:creationId xmlns:a16="http://schemas.microsoft.com/office/drawing/2014/main" id="{2FD62691-4BFB-4420-B6F0-B94853C5C065}"/>
+              </a:ext>
+            </a:extLst>
+          </p:cNvPr>
+          <p:cNvSpPr>
+            <a:spLocks noGrp="1"/>
+          </p:cNvSpPr>
+          <p:nvPr>
+            <p:ph idx="1"/>
+          </p:nvPr>
+        </p:nvSpPr>
+        <p:spPr/>
+        <p:txBody>
+          <a:bodyPr/>
+          <a:lstStyle/>
+          <a:p>
+            <a:r>
+              <a:rPr lang="en-US" dirty="0"/>
+              <a:t>The main benefit of creating areas is a reduction in the number of routes to propagate—by the filtering and the summarization of routes.</a:t>
+            </a:r>
+          </a:p>
+          <a:p>
+            <a:r>
+              <a:rPr lang="en-US" dirty="0"/>
+              <a:t>Areas are identified by an area ID.</a:t>
+            </a:r>
+          </a:p>
+          <a:p>
+            <a:r>
+              <a:rPr lang="en-US" dirty="0"/>
+              <a:t>All network inside an area must be connected.</a:t>
+            </a:r>
+          </a:p>
+          <a:p>
+            <a:r>
+              <a:rPr lang="en-US" dirty="0"/>
+              <a:t>At the border of an area, special router called </a:t>
+            </a:r>
+            <a:r>
+              <a:rPr lang="en-US" b="1" dirty="0"/>
+              <a:t>area border routers</a:t>
+            </a:r>
+            <a:r>
+              <a:rPr lang="en-US" dirty="0"/>
+              <a:t>.</a:t>
+            </a:r>
+          </a:p>
+          <a:p>
+            <a:r>
+              <a:rPr lang="en-US" dirty="0"/>
+              <a:t>It summarizes the information and send to other areas. </a:t>
+            </a:r>
+            <a:endParaRPr lang="en-IN" dirty="0"/>
+          </a:p>
+        </p:txBody>
+      </p:sp>
+    </p:spTree>
+    <p:extLst>
+      <p:ext uri="{BB962C8B-B14F-4D97-AF65-F5344CB8AC3E}">
+        <p14:creationId xmlns:p14="http://schemas.microsoft.com/office/powerpoint/2010/main" val="676686836"/>
+      </p:ext>
+    </p:extLst>
+  </p:cSld>
+  <p:clrMapOvr>
+    <a:masterClrMapping/>
+  </p:clrMapOvr>
+</p:sld>
+</file>
+
+<file path=ppt/slides/slide17.xml><?xml version="1.0" encoding="utf-8"?>
+<p:sld xmlns:a="http://schemas.openxmlformats.org/drawingml/2006/main" xmlns:r="http://schemas.openxmlformats.org/officeDocument/2006/relationships" xmlns:p="http://schemas.openxmlformats.org/presentationml/2006/main">
+  <p:cSld>
+    <p:spTree>
+      <p:nvGrpSpPr>
+        <p:cNvPr id="1" name=""/>
+        <p:cNvGrpSpPr/>
+        <p:nvPr/>
+      </p:nvGrpSpPr>
+      <p:grpSpPr>
+        <a:xfrm>
+          <a:off x="0" y="0"/>
+          <a:ext cx="0" cy="0"/>
+          <a:chOff x="0" y="0"/>
+          <a:chExt cx="0" cy="0"/>
+        </a:xfrm>
+      </p:grpSpPr>
+      <p:sp>
+        <p:nvSpPr>
+          <p:cNvPr id="2" name="Title 1">
+            <a:extLst>
+              <a:ext uri="{FF2B5EF4-FFF2-40B4-BE49-F238E27FC236}">
+                <a16:creationId xmlns:a16="http://schemas.microsoft.com/office/drawing/2014/main" id="{3AE368C4-4633-45E8-AD28-0857287B3EA0}"/>
+              </a:ext>
+            </a:extLst>
+          </p:cNvPr>
+          <p:cNvSpPr>
+            <a:spLocks noGrp="1"/>
+          </p:cNvSpPr>
+          <p:nvPr>
+            <p:ph type="title"/>
+          </p:nvPr>
+        </p:nvSpPr>
+        <p:spPr/>
+        <p:txBody>
+          <a:bodyPr/>
+          <a:lstStyle/>
+          <a:p>
+            <a:r>
+              <a:rPr lang="en-IN" dirty="0"/>
+              <a:t>Backbone Area</a:t>
+            </a:r>
+          </a:p>
+        </p:txBody>
+      </p:sp>
+      <p:sp>
+        <p:nvSpPr>
+          <p:cNvPr id="3" name="Content Placeholder 2">
+            <a:extLst>
+              <a:ext uri="{FF2B5EF4-FFF2-40B4-BE49-F238E27FC236}">
+                <a16:creationId xmlns:a16="http://schemas.microsoft.com/office/drawing/2014/main" id="{9A4EF1A1-D3DA-4526-9612-BE44DB408A74}"/>
+              </a:ext>
+            </a:extLst>
+          </p:cNvPr>
+          <p:cNvSpPr>
+            <a:spLocks noGrp="1"/>
+          </p:cNvSpPr>
+          <p:nvPr>
+            <p:ph idx="1"/>
+          </p:nvPr>
+        </p:nvSpPr>
+        <p:spPr/>
+        <p:txBody>
+          <a:bodyPr>
+            <a:normAutofit fontScale="92500"/>
+          </a:bodyPr>
+          <a:lstStyle/>
+          <a:p>
+            <a:r>
+              <a:rPr lang="en-US" b="1" dirty="0"/>
+              <a:t>A backbone area</a:t>
+            </a:r>
+            <a:r>
+              <a:rPr lang="en-US" dirty="0"/>
+              <a:t>—which combines a set of independent areas into a single domain.</a:t>
+            </a:r>
+          </a:p>
+          <a:p>
+            <a:r>
+              <a:rPr lang="en-US" dirty="0"/>
+              <a:t>The backbone has the reserved area ID of 0.0.0.0. The OSPF backbone area is also known as area 0.</a:t>
+            </a:r>
+          </a:p>
+          <a:p>
+            <a:r>
+              <a:rPr lang="en-US" dirty="0"/>
+              <a:t>The backbone acts as a hub for inter-area transit traffic and the distribution of routing information between areas. </a:t>
+            </a:r>
+          </a:p>
+          <a:p>
+            <a:r>
+              <a:rPr lang="en-US" dirty="0"/>
+              <a:t>Each non-backbone area must be directly connected to the backbone area.</a:t>
+            </a:r>
+          </a:p>
+          <a:p>
+            <a:r>
+              <a:rPr lang="en-US" dirty="0"/>
+              <a:t>The backbone area must not be partitioned—divided into smaller pieces—under any failure conditions. </a:t>
+            </a:r>
+            <a:endParaRPr lang="en-IN" dirty="0"/>
+          </a:p>
+        </p:txBody>
+      </p:sp>
+    </p:spTree>
+    <p:extLst>
+      <p:ext uri="{BB962C8B-B14F-4D97-AF65-F5344CB8AC3E}">
+        <p14:creationId xmlns:p14="http://schemas.microsoft.com/office/powerpoint/2010/main" val="2958239433"/>
+      </p:ext>
+    </p:extLst>
+  </p:cSld>
+  <p:clrMapOvr>
+    <a:masterClrMapping/>
+  </p:clrMapOvr>
+</p:sld>
+</file>
+
+<file path=ppt/slides/slide18.xml><?xml version="1.0" encoding="utf-8"?>
+<p:sld xmlns:a="http://schemas.openxmlformats.org/drawingml/2006/main" xmlns:r="http://schemas.openxmlformats.org/officeDocument/2006/relationships" xmlns:p="http://schemas.openxmlformats.org/presentationml/2006/main">
+  <p:cSld>
+    <p:spTree>
+      <p:nvGrpSpPr>
+        <p:cNvPr id="1" name=""/>
+        <p:cNvGrpSpPr/>
+        <p:nvPr/>
+      </p:nvGrpSpPr>
+      <p:grpSpPr>
+        <a:xfrm>
+          <a:off x="0" y="0"/>
+          <a:ext cx="0" cy="0"/>
+          <a:chOff x="0" y="0"/>
+          <a:chExt cx="0" cy="0"/>
+        </a:xfrm>
+      </p:grpSpPr>
+      <p:sp>
+        <p:nvSpPr>
+          <p:cNvPr id="12" name="Content Placeholder 11">
+            <a:extLst>
+              <a:ext uri="{FF2B5EF4-FFF2-40B4-BE49-F238E27FC236}">
+                <a16:creationId xmlns:a16="http://schemas.microsoft.com/office/drawing/2014/main" id="{AC4FD2FB-8478-462E-A038-6A5920E41650}"/>
+              </a:ext>
+            </a:extLst>
+          </p:cNvPr>
+          <p:cNvSpPr>
+            <a:spLocks noGrp="1"/>
+          </p:cNvSpPr>
+          <p:nvPr>
+            <p:ph idx="1"/>
+          </p:nvPr>
+        </p:nvSpPr>
+        <p:spPr>
+          <a:xfrm>
+            <a:off x="504825" y="457200"/>
+            <a:ext cx="8229600" cy="2057400"/>
+          </a:xfrm>
+        </p:spPr>
+        <p:txBody>
+          <a:bodyPr/>
+          <a:lstStyle/>
+          <a:p>
+            <a:r>
+              <a:rPr lang="en-US" dirty="0"/>
+              <a:t>The backbone serves as primary area and the other areas as secondary areas.</a:t>
+            </a:r>
+          </a:p>
+          <a:p>
+            <a:r>
+              <a:rPr lang="en-US" dirty="0"/>
+              <a:t>The router inside backbone area is known as </a:t>
+            </a:r>
+            <a:r>
+              <a:rPr lang="en-US" i="1" dirty="0">
+                <a:latin typeface="Garamond" panose="02020404030301010803" pitchFamily="18" charset="0"/>
+              </a:rPr>
+              <a:t>backbone routers</a:t>
+            </a:r>
+            <a:r>
+              <a:rPr lang="en-US" dirty="0">
+                <a:latin typeface="Garamond" panose="02020404030301010803" pitchFamily="18" charset="0"/>
+              </a:rPr>
+              <a:t>. </a:t>
+            </a:r>
+            <a:endParaRPr lang="en-IN" dirty="0">
+              <a:latin typeface="Garamond" panose="02020404030301010803" pitchFamily="18" charset="0"/>
+            </a:endParaRPr>
+          </a:p>
+        </p:txBody>
+      </p:sp>
       <p:pic>
         <p:nvPicPr>
-          <p:cNvPr id="4098" name="Picture 2"/>
+          <p:cNvPr id="17" name="Picture 16" descr="A picture containing screenshot, drawing&#10;&#10;Description automatically generated">
+            <a:extLst>
+              <a:ext uri="{FF2B5EF4-FFF2-40B4-BE49-F238E27FC236}">
+                <a16:creationId xmlns:a16="http://schemas.microsoft.com/office/drawing/2014/main" id="{8F0480A6-11E0-417A-9473-2300AB67F47C}"/>
+              </a:ext>
+            </a:extLst>
+          </p:cNvPr>
           <p:cNvPicPr>
-            <a:picLocks noGrp="1" noChangeAspect="1" noChangeArrowheads="1"/>
+            <a:picLocks noChangeAspect="1"/>
           </p:cNvPicPr>
-          <p:nvPr>
-            <p:ph idx="1"/>
-          </p:nvPr>
+          <p:nvPr/>
         </p:nvPicPr>
         <p:blipFill>
           <a:blip r:embed="rId2">
@@ -3506,15 +4496,103 @@
               </a:ext>
             </a:extLst>
           </a:blip>
-          <a:srcRect/>
           <a:stretch>
             <a:fillRect/>
           </a:stretch>
         </p:blipFill>
+        <p:spPr>
+          <a:xfrm>
+            <a:off x="450070" y="2514600"/>
+            <a:ext cx="8243859" cy="3917950"/>
+          </a:xfrm>
+          <a:prstGeom prst="rect">
+            <a:avLst/>
+          </a:prstGeom>
+        </p:spPr>
+      </p:pic>
+    </p:spTree>
+    <p:extLst>
+      <p:ext uri="{BB962C8B-B14F-4D97-AF65-F5344CB8AC3E}">
+        <p14:creationId xmlns:p14="http://schemas.microsoft.com/office/powerpoint/2010/main" val="1396930126"/>
+      </p:ext>
+    </p:extLst>
+  </p:cSld>
+  <p:clrMapOvr>
+    <a:masterClrMapping/>
+  </p:clrMapOvr>
+</p:sld>
+</file>
+
+<file path=ppt/slides/slide19.xml><?xml version="1.0" encoding="utf-8"?>
+<p:sld xmlns:a="http://schemas.openxmlformats.org/drawingml/2006/main" xmlns:r="http://schemas.openxmlformats.org/officeDocument/2006/relationships" xmlns:p="http://schemas.openxmlformats.org/presentationml/2006/main">
+  <p:cSld>
+    <p:spTree>
+      <p:nvGrpSpPr>
+        <p:cNvPr id="1" name=""/>
+        <p:cNvGrpSpPr/>
+        <p:nvPr/>
+      </p:nvGrpSpPr>
+      <p:grpSpPr>
+        <a:xfrm>
+          <a:off x="0" y="0"/>
+          <a:ext cx="0" cy="0"/>
+          <a:chOff x="0" y="0"/>
+          <a:chExt cx="0" cy="0"/>
+        </a:xfrm>
+      </p:grpSpPr>
+      <p:sp>
+        <p:nvSpPr>
+          <p:cNvPr id="2" name="Title 1">
+            <a:extLst>
+              <a:ext uri="{FF2B5EF4-FFF2-40B4-BE49-F238E27FC236}">
+                <a16:creationId xmlns:a16="http://schemas.microsoft.com/office/drawing/2014/main" id="{F6D80090-91F9-48BB-A75A-989DDAFA5147}"/>
+              </a:ext>
+            </a:extLst>
+          </p:cNvPr>
+          <p:cNvSpPr>
+            <a:spLocks noGrp="1"/>
+          </p:cNvSpPr>
+          <p:nvPr>
+            <p:ph type="title"/>
+          </p:nvPr>
+        </p:nvSpPr>
+        <p:spPr/>
+        <p:txBody>
+          <a:bodyPr/>
+          <a:lstStyle/>
+          <a:p>
+            <a:r>
+              <a:rPr lang="en-IN" dirty="0"/>
+              <a:t>Types of Links</a:t>
+            </a:r>
+          </a:p>
+        </p:txBody>
+      </p:sp>
+      <p:pic>
+        <p:nvPicPr>
+          <p:cNvPr id="9218" name="Picture 2"/>
+          <p:cNvPicPr>
+            <a:picLocks noGrp="1" noChangeAspect="1" noChangeArrowheads="1"/>
+          </p:cNvPicPr>
+          <p:nvPr>
+            <p:ph sz="half" idx="1"/>
+          </p:nvPr>
+        </p:nvPicPr>
+        <p:blipFill rotWithShape="1">
+          <a:blip r:embed="rId2">
+            <a:extLst>
+              <a:ext uri="{28A0092B-C50C-407E-A947-70E740481C1C}">
+                <a14:useLocalDpi xmlns:a14="http://schemas.microsoft.com/office/drawing/2010/main" val="0"/>
+              </a:ext>
+            </a:extLst>
+          </a:blip>
+          <a:srcRect l="8333" t="48911" r="12038"/>
+          <a:stretch/>
+        </p:blipFill>
         <p:spPr bwMode="auto">
           <a:xfrm>
-            <a:off x="152400" y="152400"/>
-            <a:ext cx="8305800" cy="6324600"/>
+            <a:off x="1295400" y="3003444"/>
+            <a:ext cx="6553200" cy="3156581"/>
           </a:xfrm>
           <a:prstGeom prst="rect">
             <a:avLst/>
@@ -3544,621 +4622,60 @@
           </a:extLst>
         </p:spPr>
       </p:pic>
-    </p:spTree>
-    <p:extLst>
-      <p:ext uri="{BB962C8B-B14F-4D97-AF65-F5344CB8AC3E}">
-        <p14:creationId xmlns:p14="http://schemas.microsoft.com/office/powerpoint/2010/main" val="2250892998"/>
-      </p:ext>
-    </p:extLst>
-  </p:cSld>
-  <p:clrMapOvr>
-    <a:masterClrMapping/>
-  </p:clrMapOvr>
-</p:sld>
-</file>
-
-<file path=ppt/slides/slide14.xml><?xml version="1.0" encoding="utf-8"?>
-<p:sld xmlns:a="http://schemas.openxmlformats.org/drawingml/2006/main" xmlns:r="http://schemas.openxmlformats.org/officeDocument/2006/relationships" xmlns:p="http://schemas.openxmlformats.org/presentationml/2006/main">
-  <p:cSld>
-    <p:spTree>
-      <p:nvGrpSpPr>
-        <p:cNvPr id="1" name=""/>
-        <p:cNvGrpSpPr/>
-        <p:nvPr/>
-      </p:nvGrpSpPr>
-      <p:grpSpPr>
-        <a:xfrm>
-          <a:off x="0" y="0"/>
-          <a:ext cx="0" cy="0"/>
-          <a:chOff x="0" y="0"/>
-          <a:chExt cx="0" cy="0"/>
-        </a:xfrm>
-      </p:grpSpPr>
-      <p:sp>
-        <p:nvSpPr>
-          <p:cNvPr id="2" name="Title 1"/>
-          <p:cNvSpPr>
-            <a:spLocks noGrp="1"/>
-          </p:cNvSpPr>
-          <p:nvPr>
-            <p:ph type="title"/>
-          </p:nvPr>
-        </p:nvSpPr>
-        <p:spPr/>
-        <p:txBody>
-          <a:bodyPr/>
-          <a:lstStyle/>
-          <a:p>
-            <a:endParaRPr lang="en-US"/>
-          </a:p>
-        </p:txBody>
-      </p:sp>
-      <p:pic>
-        <p:nvPicPr>
-          <p:cNvPr id="5122" name="Picture 2"/>
-          <p:cNvPicPr>
-            <a:picLocks noGrp="1" noChangeAspect="1" noChangeArrowheads="1"/>
-          </p:cNvPicPr>
-          <p:nvPr>
-            <p:ph idx="1"/>
-          </p:nvPr>
-        </p:nvPicPr>
-        <p:blipFill>
-          <a:blip r:embed="rId2">
+      <p:sp>
+        <p:nvSpPr>
+          <p:cNvPr id="3" name="Content Placeholder 2">
             <a:extLst>
-              <a:ext uri="{28A0092B-C50C-407E-A947-70E740481C1C}">
-                <a14:useLocalDpi xmlns:a14="http://schemas.microsoft.com/office/drawing/2010/main" val="0"/>
+              <a:ext uri="{FF2B5EF4-FFF2-40B4-BE49-F238E27FC236}">
+                <a16:creationId xmlns:a16="http://schemas.microsoft.com/office/drawing/2014/main" id="{557393FE-2059-423D-B8CC-93156FD9AC1C}"/>
               </a:ext>
             </a:extLst>
-          </a:blip>
-          <a:srcRect/>
-          <a:stretch>
-            <a:fillRect/>
-          </a:stretch>
-        </p:blipFill>
-        <p:spPr bwMode="auto">
+          </p:cNvPr>
+          <p:cNvSpPr>
+            <a:spLocks noGrp="1"/>
+          </p:cNvSpPr>
+          <p:nvPr>
+            <p:ph sz="half" idx="2"/>
+          </p:nvPr>
+        </p:nvSpPr>
+        <p:spPr>
           <a:xfrm>
-            <a:off x="228600" y="76200"/>
-            <a:ext cx="8915400" cy="6629400"/>
+            <a:off x="381000" y="1600201"/>
+            <a:ext cx="8305800" cy="1219200"/>
           </a:xfrm>
-          <a:prstGeom prst="rect">
-            <a:avLst/>
-          </a:prstGeom>
-          <a:noFill/>
-          <a:ln>
-            <a:noFill/>
-          </a:ln>
-          <a:extLst>
-            <a:ext uri="{909E8E84-426E-40DD-AFC4-6F175D3DCCD1}">
-              <a14:hiddenFill xmlns:a14="http://schemas.microsoft.com/office/drawing/2010/main">
-                <a:solidFill>
-                  <a:schemeClr val="accent1"/>
-                </a:solidFill>
-              </a14:hiddenFill>
-            </a:ext>
-            <a:ext uri="{91240B29-F687-4F45-9708-019B960494DF}">
-              <a14:hiddenLine xmlns:a14="http://schemas.microsoft.com/office/drawing/2010/main" w="9525">
-                <a:solidFill>
-                  <a:schemeClr val="tx1"/>
-                </a:solidFill>
-                <a:miter lim="800000"/>
-                <a:headEnd/>
-                <a:tailEnd/>
-              </a14:hiddenLine>
-            </a:ext>
-          </a:extLst>
         </p:spPr>
-      </p:pic>
-    </p:spTree>
-    <p:extLst>
-      <p:ext uri="{BB962C8B-B14F-4D97-AF65-F5344CB8AC3E}">
-        <p14:creationId xmlns:p14="http://schemas.microsoft.com/office/powerpoint/2010/main" val="1472469272"/>
-      </p:ext>
-    </p:extLst>
-  </p:cSld>
-  <p:clrMapOvr>
-    <a:masterClrMapping/>
-  </p:clrMapOvr>
-</p:sld>
-</file>
-
-<file path=ppt/slides/slide15.xml><?xml version="1.0" encoding="utf-8"?>
-<p:sld xmlns:a="http://schemas.openxmlformats.org/drawingml/2006/main" xmlns:r="http://schemas.openxmlformats.org/officeDocument/2006/relationships" xmlns:p="http://schemas.openxmlformats.org/presentationml/2006/main">
-  <p:cSld>
-    <p:spTree>
-      <p:nvGrpSpPr>
-        <p:cNvPr id="1" name=""/>
-        <p:cNvGrpSpPr/>
-        <p:nvPr/>
-      </p:nvGrpSpPr>
-      <p:grpSpPr>
-        <a:xfrm>
-          <a:off x="0" y="0"/>
-          <a:ext cx="0" cy="0"/>
-          <a:chOff x="0" y="0"/>
-          <a:chExt cx="0" cy="0"/>
-        </a:xfrm>
-      </p:grpSpPr>
-      <p:sp>
-        <p:nvSpPr>
-          <p:cNvPr id="2" name="Title 1"/>
-          <p:cNvSpPr>
-            <a:spLocks noGrp="1"/>
-          </p:cNvSpPr>
-          <p:nvPr>
-            <p:ph type="title"/>
-          </p:nvPr>
-        </p:nvSpPr>
-        <p:spPr/>
-        <p:txBody>
-          <a:bodyPr/>
-          <a:lstStyle/>
-          <a:p>
-            <a:endParaRPr lang="en-US"/>
-          </a:p>
-        </p:txBody>
-      </p:sp>
-      <p:pic>
-        <p:nvPicPr>
-          <p:cNvPr id="6146" name="Picture 2"/>
-          <p:cNvPicPr>
-            <a:picLocks noGrp="1" noChangeAspect="1" noChangeArrowheads="1"/>
-          </p:cNvPicPr>
-          <p:nvPr>
-            <p:ph idx="1"/>
-          </p:nvPr>
-        </p:nvPicPr>
-        <p:blipFill>
-          <a:blip r:embed="rId2">
-            <a:extLst>
-              <a:ext uri="{28A0092B-C50C-407E-A947-70E740481C1C}">
-                <a14:useLocalDpi xmlns:a14="http://schemas.microsoft.com/office/drawing/2010/main" val="0"/>
-              </a:ext>
-            </a:extLst>
-          </a:blip>
-          <a:srcRect/>
-          <a:stretch>
-            <a:fillRect/>
-          </a:stretch>
-        </p:blipFill>
-        <p:spPr bwMode="auto">
-          <a:xfrm>
-            <a:off x="228600" y="228600"/>
-            <a:ext cx="8610600" cy="5897563"/>
-          </a:xfrm>
-          <a:prstGeom prst="rect">
-            <a:avLst/>
-          </a:prstGeom>
-          <a:noFill/>
-          <a:ln>
-            <a:noFill/>
-          </a:ln>
-          <a:extLst>
-            <a:ext uri="{909E8E84-426E-40DD-AFC4-6F175D3DCCD1}">
-              <a14:hiddenFill xmlns:a14="http://schemas.microsoft.com/office/drawing/2010/main">
-                <a:solidFill>
-                  <a:schemeClr val="accent1"/>
-                </a:solidFill>
-              </a14:hiddenFill>
-            </a:ext>
-            <a:ext uri="{91240B29-F687-4F45-9708-019B960494DF}">
-              <a14:hiddenLine xmlns:a14="http://schemas.microsoft.com/office/drawing/2010/main" w="9525">
-                <a:solidFill>
-                  <a:schemeClr val="tx1"/>
-                </a:solidFill>
-                <a:miter lim="800000"/>
-                <a:headEnd/>
-                <a:tailEnd/>
-              </a14:hiddenLine>
-            </a:ext>
-          </a:extLst>
-        </p:spPr>
-      </p:pic>
-    </p:spTree>
-    <p:extLst>
-      <p:ext uri="{BB962C8B-B14F-4D97-AF65-F5344CB8AC3E}">
-        <p14:creationId xmlns:p14="http://schemas.microsoft.com/office/powerpoint/2010/main" val="3183854504"/>
-      </p:ext>
-    </p:extLst>
-  </p:cSld>
-  <p:clrMapOvr>
-    <a:masterClrMapping/>
-  </p:clrMapOvr>
-</p:sld>
-</file>
-
-<file path=ppt/slides/slide16.xml><?xml version="1.0" encoding="utf-8"?>
-<p:sld xmlns:a="http://schemas.openxmlformats.org/drawingml/2006/main" xmlns:r="http://schemas.openxmlformats.org/officeDocument/2006/relationships" xmlns:p="http://schemas.openxmlformats.org/presentationml/2006/main">
-  <p:cSld>
-    <p:spTree>
-      <p:nvGrpSpPr>
-        <p:cNvPr id="1" name=""/>
-        <p:cNvGrpSpPr/>
-        <p:nvPr/>
-      </p:nvGrpSpPr>
-      <p:grpSpPr>
-        <a:xfrm>
-          <a:off x="0" y="0"/>
-          <a:ext cx="0" cy="0"/>
-          <a:chOff x="0" y="0"/>
-          <a:chExt cx="0" cy="0"/>
-        </a:xfrm>
-      </p:grpSpPr>
-      <p:pic>
-        <p:nvPicPr>
-          <p:cNvPr id="7170" name="Picture 2"/>
-          <p:cNvPicPr>
-            <a:picLocks noGrp="1" noChangeAspect="1" noChangeArrowheads="1"/>
-          </p:cNvPicPr>
-          <p:nvPr>
-            <p:ph idx="1"/>
-          </p:nvPr>
-        </p:nvPicPr>
-        <p:blipFill>
-          <a:blip r:embed="rId2">
-            <a:extLst>
-              <a:ext uri="{28A0092B-C50C-407E-A947-70E740481C1C}">
-                <a14:useLocalDpi xmlns:a14="http://schemas.microsoft.com/office/drawing/2010/main" val="0"/>
-              </a:ext>
-            </a:extLst>
-          </a:blip>
-          <a:srcRect/>
-          <a:stretch>
-            <a:fillRect/>
-          </a:stretch>
-        </p:blipFill>
-        <p:spPr bwMode="auto">
-          <a:xfrm>
-            <a:off x="152400" y="381000"/>
-            <a:ext cx="8534400" cy="6248400"/>
-          </a:xfrm>
-          <a:prstGeom prst="rect">
-            <a:avLst/>
-          </a:prstGeom>
-          <a:noFill/>
-          <a:ln>
-            <a:noFill/>
-          </a:ln>
-          <a:extLst>
-            <a:ext uri="{909E8E84-426E-40DD-AFC4-6F175D3DCCD1}">
-              <a14:hiddenFill xmlns:a14="http://schemas.microsoft.com/office/drawing/2010/main">
-                <a:solidFill>
-                  <a:schemeClr val="accent1"/>
-                </a:solidFill>
-              </a14:hiddenFill>
-            </a:ext>
-            <a:ext uri="{91240B29-F687-4F45-9708-019B960494DF}">
-              <a14:hiddenLine xmlns:a14="http://schemas.microsoft.com/office/drawing/2010/main" w="9525">
-                <a:solidFill>
-                  <a:schemeClr val="tx1"/>
-                </a:solidFill>
-                <a:miter lim="800000"/>
-                <a:headEnd/>
-                <a:tailEnd/>
-              </a14:hiddenLine>
-            </a:ext>
-          </a:extLst>
-        </p:spPr>
-      </p:pic>
-    </p:spTree>
-    <p:extLst>
-      <p:ext uri="{BB962C8B-B14F-4D97-AF65-F5344CB8AC3E}">
-        <p14:creationId xmlns:p14="http://schemas.microsoft.com/office/powerpoint/2010/main" val="2060333286"/>
-      </p:ext>
-    </p:extLst>
-  </p:cSld>
-  <p:clrMapOvr>
-    <a:masterClrMapping/>
-  </p:clrMapOvr>
-</p:sld>
-</file>
-
-<file path=ppt/slides/slide17.xml><?xml version="1.0" encoding="utf-8"?>
-<p:sld xmlns:a="http://schemas.openxmlformats.org/drawingml/2006/main" xmlns:r="http://schemas.openxmlformats.org/officeDocument/2006/relationships" xmlns:p="http://schemas.openxmlformats.org/presentationml/2006/main">
-  <p:cSld>
-    <p:spTree>
-      <p:nvGrpSpPr>
-        <p:cNvPr id="1" name=""/>
-        <p:cNvGrpSpPr/>
-        <p:nvPr/>
-      </p:nvGrpSpPr>
-      <p:grpSpPr>
-        <a:xfrm>
-          <a:off x="0" y="0"/>
-          <a:ext cx="0" cy="0"/>
-          <a:chOff x="0" y="0"/>
-          <a:chExt cx="0" cy="0"/>
-        </a:xfrm>
-      </p:grpSpPr>
-      <p:sp>
-        <p:nvSpPr>
-          <p:cNvPr id="2" name="Title 1"/>
-          <p:cNvSpPr>
-            <a:spLocks noGrp="1"/>
-          </p:cNvSpPr>
-          <p:nvPr>
-            <p:ph type="title"/>
-          </p:nvPr>
-        </p:nvSpPr>
-        <p:spPr/>
-        <p:txBody>
-          <a:bodyPr/>
-          <a:lstStyle/>
-          <a:p>
-            <a:endParaRPr lang="en-US"/>
-          </a:p>
-        </p:txBody>
-      </p:sp>
-      <p:pic>
-        <p:nvPicPr>
-          <p:cNvPr id="8194" name="Picture 2"/>
-          <p:cNvPicPr>
-            <a:picLocks noGrp="1" noChangeAspect="1" noChangeArrowheads="1"/>
-          </p:cNvPicPr>
-          <p:nvPr>
-            <p:ph idx="1"/>
-          </p:nvPr>
-        </p:nvPicPr>
-        <p:blipFill>
-          <a:blip r:embed="rId2">
-            <a:extLst>
-              <a:ext uri="{28A0092B-C50C-407E-A947-70E740481C1C}">
-                <a14:useLocalDpi xmlns:a14="http://schemas.microsoft.com/office/drawing/2010/main" val="0"/>
-              </a:ext>
-            </a:extLst>
-          </a:blip>
-          <a:srcRect/>
-          <a:stretch>
-            <a:fillRect/>
-          </a:stretch>
-        </p:blipFill>
-        <p:spPr bwMode="auto">
-          <a:xfrm>
-            <a:off x="0" y="228600"/>
-            <a:ext cx="8839200" cy="6629400"/>
-          </a:xfrm>
-          <a:prstGeom prst="rect">
-            <a:avLst/>
-          </a:prstGeom>
-          <a:noFill/>
-          <a:ln>
-            <a:noFill/>
-          </a:ln>
-          <a:extLst>
-            <a:ext uri="{909E8E84-426E-40DD-AFC4-6F175D3DCCD1}">
-              <a14:hiddenFill xmlns:a14="http://schemas.microsoft.com/office/drawing/2010/main">
-                <a:solidFill>
-                  <a:schemeClr val="accent1"/>
-                </a:solidFill>
-              </a14:hiddenFill>
-            </a:ext>
-            <a:ext uri="{91240B29-F687-4F45-9708-019B960494DF}">
-              <a14:hiddenLine xmlns:a14="http://schemas.microsoft.com/office/drawing/2010/main" w="9525">
-                <a:solidFill>
-                  <a:schemeClr val="tx1"/>
-                </a:solidFill>
-                <a:miter lim="800000"/>
-                <a:headEnd/>
-                <a:tailEnd/>
-              </a14:hiddenLine>
-            </a:ext>
-          </a:extLst>
-        </p:spPr>
-      </p:pic>
-    </p:spTree>
-    <p:extLst>
-      <p:ext uri="{BB962C8B-B14F-4D97-AF65-F5344CB8AC3E}">
-        <p14:creationId xmlns:p14="http://schemas.microsoft.com/office/powerpoint/2010/main" val="1396930126"/>
-      </p:ext>
-    </p:extLst>
-  </p:cSld>
-  <p:clrMapOvr>
-    <a:masterClrMapping/>
-  </p:clrMapOvr>
-</p:sld>
-</file>
-
-<file path=ppt/slides/slide18.xml><?xml version="1.0" encoding="utf-8"?>
-<p:sld xmlns:a="http://schemas.openxmlformats.org/drawingml/2006/main" xmlns:r="http://schemas.openxmlformats.org/officeDocument/2006/relationships" xmlns:p="http://schemas.openxmlformats.org/presentationml/2006/main">
-  <p:cSld>
-    <p:spTree>
-      <p:nvGrpSpPr>
-        <p:cNvPr id="1" name=""/>
-        <p:cNvGrpSpPr/>
-        <p:nvPr/>
-      </p:nvGrpSpPr>
-      <p:grpSpPr>
-        <a:xfrm>
-          <a:off x="0" y="0"/>
-          <a:ext cx="0" cy="0"/>
-          <a:chOff x="0" y="0"/>
-          <a:chExt cx="0" cy="0"/>
-        </a:xfrm>
-      </p:grpSpPr>
-      <p:sp>
-        <p:nvSpPr>
-          <p:cNvPr id="2" name="Title 1"/>
-          <p:cNvSpPr>
-            <a:spLocks noGrp="1"/>
-          </p:cNvSpPr>
-          <p:nvPr>
-            <p:ph type="title"/>
-          </p:nvPr>
-        </p:nvSpPr>
-        <p:spPr/>
-        <p:txBody>
-          <a:bodyPr/>
-          <a:lstStyle/>
-          <a:p>
-            <a:endParaRPr lang="en-US"/>
-          </a:p>
-        </p:txBody>
-      </p:sp>
-      <p:pic>
-        <p:nvPicPr>
-          <p:cNvPr id="9218" name="Picture 2"/>
-          <p:cNvPicPr>
-            <a:picLocks noGrp="1" noChangeAspect="1" noChangeArrowheads="1"/>
-          </p:cNvPicPr>
-          <p:nvPr>
-            <p:ph idx="1"/>
-          </p:nvPr>
-        </p:nvPicPr>
-        <p:blipFill>
-          <a:blip r:embed="rId2">
-            <a:extLst>
-              <a:ext uri="{28A0092B-C50C-407E-A947-70E740481C1C}">
-                <a14:useLocalDpi xmlns:a14="http://schemas.microsoft.com/office/drawing/2010/main" val="0"/>
-              </a:ext>
-            </a:extLst>
-          </a:blip>
-          <a:srcRect/>
-          <a:stretch>
-            <a:fillRect/>
-          </a:stretch>
-        </p:blipFill>
-        <p:spPr bwMode="auto">
-          <a:xfrm>
-            <a:off x="76200" y="0"/>
-            <a:ext cx="8763000" cy="6126163"/>
-          </a:xfrm>
-          <a:prstGeom prst="rect">
-            <a:avLst/>
-          </a:prstGeom>
-          <a:noFill/>
-          <a:ln>
-            <a:noFill/>
-          </a:ln>
-          <a:extLst>
-            <a:ext uri="{909E8E84-426E-40DD-AFC4-6F175D3DCCD1}">
-              <a14:hiddenFill xmlns:a14="http://schemas.microsoft.com/office/drawing/2010/main">
-                <a:solidFill>
-                  <a:schemeClr val="accent1"/>
-                </a:solidFill>
-              </a14:hiddenFill>
-            </a:ext>
-            <a:ext uri="{91240B29-F687-4F45-9708-019B960494DF}">
-              <a14:hiddenLine xmlns:a14="http://schemas.microsoft.com/office/drawing/2010/main" w="9525">
-                <a:solidFill>
-                  <a:schemeClr val="tx1"/>
-                </a:solidFill>
-                <a:miter lim="800000"/>
-                <a:headEnd/>
-                <a:tailEnd/>
-              </a14:hiddenLine>
-            </a:ext>
-          </a:extLst>
-        </p:spPr>
-      </p:pic>
+        <p:txBody>
+          <a:bodyPr/>
+          <a:lstStyle/>
+          <a:p>
+            <a:r>
+              <a:rPr lang="en-IN" dirty="0"/>
+              <a:t>In OSPF, a connection is called a </a:t>
+            </a:r>
+            <a:r>
+              <a:rPr lang="en-IN" i="1" dirty="0">
+                <a:latin typeface="Garamond" panose="02020404030301010803" pitchFamily="18" charset="0"/>
+              </a:rPr>
+              <a:t>link. </a:t>
+            </a:r>
+          </a:p>
+          <a:p>
+            <a:r>
+              <a:rPr lang="en-IN" dirty="0"/>
+              <a:t>4 types of links have been defined: </a:t>
+            </a:r>
+            <a:r>
+              <a:rPr lang="en-IN" i="1" dirty="0"/>
+              <a:t> </a:t>
+            </a:r>
+            <a:endParaRPr lang="en-IN" dirty="0"/>
+          </a:p>
+        </p:txBody>
+      </p:sp>
     </p:spTree>
     <p:extLst>
       <p:ext uri="{BB962C8B-B14F-4D97-AF65-F5344CB8AC3E}">
         <p14:creationId xmlns:p14="http://schemas.microsoft.com/office/powerpoint/2010/main" val="1526161175"/>
-      </p:ext>
-    </p:extLst>
-  </p:cSld>
-  <p:clrMapOvr>
-    <a:masterClrMapping/>
-  </p:clrMapOvr>
-</p:sld>
-</file>
-
-<file path=ppt/slides/slide19.xml><?xml version="1.0" encoding="utf-8"?>
-<p:sld xmlns:a="http://schemas.openxmlformats.org/drawingml/2006/main" xmlns:r="http://schemas.openxmlformats.org/officeDocument/2006/relationships" xmlns:p="http://schemas.openxmlformats.org/presentationml/2006/main">
-  <p:cSld>
-    <p:spTree>
-      <p:nvGrpSpPr>
-        <p:cNvPr id="1" name=""/>
-        <p:cNvGrpSpPr/>
-        <p:nvPr/>
-      </p:nvGrpSpPr>
-      <p:grpSpPr>
-        <a:xfrm>
-          <a:off x="0" y="0"/>
-          <a:ext cx="0" cy="0"/>
-          <a:chOff x="0" y="0"/>
-          <a:chExt cx="0" cy="0"/>
-        </a:xfrm>
-      </p:grpSpPr>
-      <p:sp>
-        <p:nvSpPr>
-          <p:cNvPr id="2" name="Title 1"/>
-          <p:cNvSpPr>
-            <a:spLocks noGrp="1"/>
-          </p:cNvSpPr>
-          <p:nvPr>
-            <p:ph type="title"/>
-          </p:nvPr>
-        </p:nvSpPr>
-        <p:spPr/>
-        <p:txBody>
-          <a:bodyPr/>
-          <a:lstStyle/>
-          <a:p>
-            <a:endParaRPr lang="en-US"/>
-          </a:p>
-        </p:txBody>
-      </p:sp>
-      <p:pic>
-        <p:nvPicPr>
-          <p:cNvPr id="10242" name="Picture 2"/>
-          <p:cNvPicPr>
-            <a:picLocks noGrp="1" noChangeAspect="1" noChangeArrowheads="1"/>
-          </p:cNvPicPr>
-          <p:nvPr>
-            <p:ph idx="1"/>
-          </p:nvPr>
-        </p:nvPicPr>
-        <p:blipFill>
-          <a:blip r:embed="rId2">
-            <a:extLst>
-              <a:ext uri="{28A0092B-C50C-407E-A947-70E740481C1C}">
-                <a14:useLocalDpi xmlns:a14="http://schemas.microsoft.com/office/drawing/2010/main" val="0"/>
-              </a:ext>
-            </a:extLst>
-          </a:blip>
-          <a:srcRect/>
-          <a:stretch>
-            <a:fillRect/>
-          </a:stretch>
-        </p:blipFill>
-        <p:spPr bwMode="auto">
-          <a:xfrm>
-            <a:off x="0" y="76200"/>
-            <a:ext cx="8991600" cy="6705600"/>
-          </a:xfrm>
-          <a:prstGeom prst="rect">
-            <a:avLst/>
-          </a:prstGeom>
-          <a:noFill/>
-          <a:ln>
-            <a:noFill/>
-          </a:ln>
-          <a:extLst>
-            <a:ext uri="{909E8E84-426E-40DD-AFC4-6F175D3DCCD1}">
-              <a14:hiddenFill xmlns:a14="http://schemas.microsoft.com/office/drawing/2010/main">
-                <a:solidFill>
-                  <a:schemeClr val="accent1"/>
-                </a:solidFill>
-              </a14:hiddenFill>
-            </a:ext>
-            <a:ext uri="{91240B29-F687-4F45-9708-019B960494DF}">
-              <a14:hiddenLine xmlns:a14="http://schemas.microsoft.com/office/drawing/2010/main" w="9525">
-                <a:solidFill>
-                  <a:schemeClr val="tx1"/>
-                </a:solidFill>
-                <a:miter lim="800000"/>
-                <a:headEnd/>
-                <a:tailEnd/>
-              </a14:hiddenLine>
-            </a:ext>
-          </a:extLst>
-        </p:spPr>
-      </p:pic>
-    </p:spTree>
-    <p:extLst>
-      <p:ext uri="{BB962C8B-B14F-4D97-AF65-F5344CB8AC3E}">
-        <p14:creationId xmlns:p14="http://schemas.microsoft.com/office/powerpoint/2010/main" val="1353791617"/>
       </p:ext>
     </p:extLst>
   </p:cSld>
@@ -4262,17 +4779,55 @@
           <a:chExt cx="0" cy="0"/>
         </a:xfrm>
       </p:grpSpPr>
+      <p:sp>
+        <p:nvSpPr>
+          <p:cNvPr id="3" name="Title 2">
+            <a:extLst>
+              <a:ext uri="{FF2B5EF4-FFF2-40B4-BE49-F238E27FC236}">
+                <a16:creationId xmlns:a16="http://schemas.microsoft.com/office/drawing/2014/main" id="{CDD513AE-6204-4183-8C64-25EFBA20B98B}"/>
+              </a:ext>
+            </a:extLst>
+          </p:cNvPr>
+          <p:cNvSpPr>
+            <a:spLocks noGrp="1"/>
+          </p:cNvSpPr>
+          <p:nvPr>
+            <p:ph type="title"/>
+          </p:nvPr>
+        </p:nvSpPr>
+        <p:spPr/>
+        <p:txBody>
+          <a:bodyPr/>
+          <a:lstStyle/>
+          <a:p>
+            <a:r>
+              <a:rPr lang="en-IN" dirty="0">
+                <a:solidFill>
+                  <a:srgbClr val="002060"/>
+                </a:solidFill>
+              </a:rPr>
+              <a:t>Point-to-Point Link</a:t>
+            </a:r>
+          </a:p>
+        </p:txBody>
+      </p:sp>
       <p:pic>
         <p:nvPicPr>
-          <p:cNvPr id="11266" name="Picture 2"/>
+          <p:cNvPr id="7" name="Content Placeholder 6" descr="A screenshot of a cell phone&#10;&#10;Description automatically generated">
+            <a:extLst>
+              <a:ext uri="{FF2B5EF4-FFF2-40B4-BE49-F238E27FC236}">
+                <a16:creationId xmlns:a16="http://schemas.microsoft.com/office/drawing/2014/main" id="{7347B003-3CD1-4DEB-BE83-FFB9F309649B}"/>
+              </a:ext>
+            </a:extLst>
+          </p:cNvPr>
           <p:cNvPicPr>
-            <a:picLocks noGrp="1" noChangeAspect="1" noChangeArrowheads="1"/>
+            <a:picLocks noGrp="1" noChangeAspect="1"/>
           </p:cNvPicPr>
           <p:nvPr>
-            <p:ph idx="1"/>
+            <p:ph sz="half" idx="2"/>
           </p:nvPr>
         </p:nvPicPr>
-        <p:blipFill>
+        <p:blipFill rotWithShape="1">
           <a:blip r:embed="rId2">
             <a:extLst>
               <a:ext uri="{28A0092B-C50C-407E-A947-70E740481C1C}">
@@ -4280,15 +4835,172 @@
               </a:ext>
             </a:extLst>
           </a:blip>
-          <a:srcRect/>
-          <a:stretch>
-            <a:fillRect/>
-          </a:stretch>
+          <a:srcRect t="9854" b="12642"/>
+          <a:stretch/>
+        </p:blipFill>
+        <p:spPr>
+          <a:xfrm>
+            <a:off x="2552700" y="5334000"/>
+            <a:ext cx="4038600" cy="838200"/>
+          </a:xfrm>
+        </p:spPr>
+      </p:pic>
+      <p:sp>
+        <p:nvSpPr>
+          <p:cNvPr id="5" name="Content Placeholder 4">
+            <a:extLst>
+              <a:ext uri="{FF2B5EF4-FFF2-40B4-BE49-F238E27FC236}">
+                <a16:creationId xmlns:a16="http://schemas.microsoft.com/office/drawing/2014/main" id="{16C17C80-1428-49A3-BDBF-DE4D03595D83}"/>
+              </a:ext>
+            </a:extLst>
+          </p:cNvPr>
+          <p:cNvSpPr>
+            <a:spLocks noGrp="1"/>
+          </p:cNvSpPr>
+          <p:nvPr>
+            <p:ph sz="half" idx="1"/>
+          </p:nvPr>
+        </p:nvSpPr>
+        <p:spPr>
+          <a:xfrm>
+            <a:off x="457200" y="1600200"/>
+            <a:ext cx="8229600" cy="3429000"/>
+          </a:xfrm>
+        </p:spPr>
+        <p:txBody>
+          <a:bodyPr>
+            <a:normAutofit fontScale="92500" lnSpcReduction="20000"/>
+          </a:bodyPr>
+          <a:lstStyle/>
+          <a:p>
+            <a:r>
+              <a:rPr lang="en-IN" dirty="0"/>
+              <a:t>A point-to-point link is a dedicated link that connects exactly 2 communication facilities. </a:t>
+            </a:r>
+          </a:p>
+          <a:p>
+            <a:r>
+              <a:rPr lang="en-IN" dirty="0"/>
+              <a:t>It connects 2 routers without any other host or router in between. </a:t>
+            </a:r>
+          </a:p>
+          <a:p>
+            <a:pPr lvl="1"/>
+            <a:r>
+              <a:rPr lang="en-IN" dirty="0"/>
+              <a:t>E.g.: Telephone line. </a:t>
+            </a:r>
+          </a:p>
+          <a:p>
+            <a:r>
+              <a:rPr lang="en-IN" dirty="0"/>
+              <a:t>No need to assign a network address to this type of link. </a:t>
+            </a:r>
+          </a:p>
+          <a:p>
+            <a:endParaRPr lang="en-IN" dirty="0"/>
+          </a:p>
+          <a:p>
+            <a:r>
+              <a:rPr lang="en-IN" dirty="0"/>
+              <a:t>Router – Nodes.</a:t>
+            </a:r>
+          </a:p>
+          <a:p>
+            <a:r>
+              <a:rPr lang="en-IN" dirty="0"/>
+              <a:t>Link – Bidirectional Edge. </a:t>
+            </a:r>
+          </a:p>
+        </p:txBody>
+      </p:sp>
+    </p:spTree>
+    <p:extLst>
+      <p:ext uri="{BB962C8B-B14F-4D97-AF65-F5344CB8AC3E}">
+        <p14:creationId xmlns:p14="http://schemas.microsoft.com/office/powerpoint/2010/main" val="1353791617"/>
+      </p:ext>
+    </p:extLst>
+  </p:cSld>
+  <p:clrMapOvr>
+    <a:masterClrMapping/>
+  </p:clrMapOvr>
+</p:sld>
+</file>
+
+<file path=ppt/slides/slide21.xml><?xml version="1.0" encoding="utf-8"?>
+<p:sld xmlns:a="http://schemas.openxmlformats.org/drawingml/2006/main" xmlns:r="http://schemas.openxmlformats.org/officeDocument/2006/relationships" xmlns:p="http://schemas.openxmlformats.org/presentationml/2006/main">
+  <p:cSld>
+    <p:spTree>
+      <p:nvGrpSpPr>
+        <p:cNvPr id="1" name=""/>
+        <p:cNvGrpSpPr/>
+        <p:nvPr/>
+      </p:nvGrpSpPr>
+      <p:grpSpPr>
+        <a:xfrm>
+          <a:off x="0" y="0"/>
+          <a:ext cx="0" cy="0"/>
+          <a:chOff x="0" y="0"/>
+          <a:chExt cx="0" cy="0"/>
+        </a:xfrm>
+      </p:grpSpPr>
+      <p:sp>
+        <p:nvSpPr>
+          <p:cNvPr id="2" name="Title 1">
+            <a:extLst>
+              <a:ext uri="{FF2B5EF4-FFF2-40B4-BE49-F238E27FC236}">
+                <a16:creationId xmlns:a16="http://schemas.microsoft.com/office/drawing/2014/main" id="{DFD515CE-9219-4641-9C26-76F9A90164DC}"/>
+              </a:ext>
+            </a:extLst>
+          </p:cNvPr>
+          <p:cNvSpPr>
+            <a:spLocks noGrp="1"/>
+          </p:cNvSpPr>
+          <p:nvPr>
+            <p:ph type="title"/>
+          </p:nvPr>
+        </p:nvSpPr>
+        <p:spPr/>
+        <p:txBody>
+          <a:bodyPr/>
+          <a:lstStyle/>
+          <a:p>
+            <a:r>
+              <a:rPr lang="en-IN" dirty="0">
+                <a:solidFill>
+                  <a:srgbClr val="002060"/>
+                </a:solidFill>
+              </a:rPr>
+              <a:t>Transient Link</a:t>
+            </a:r>
+          </a:p>
+        </p:txBody>
+      </p:sp>
+      <p:pic>
+        <p:nvPicPr>
+          <p:cNvPr id="11266" name="Picture 2"/>
+          <p:cNvPicPr>
+            <a:picLocks noGrp="1" noChangeAspect="1" noChangeArrowheads="1"/>
+          </p:cNvPicPr>
+          <p:nvPr>
+            <p:ph sz="half" idx="1"/>
+          </p:nvPr>
+        </p:nvPicPr>
+        <p:blipFill rotWithShape="1">
+          <a:blip r:embed="rId2">
+            <a:extLst>
+              <a:ext uri="{28A0092B-C50C-407E-A947-70E740481C1C}">
+                <a14:useLocalDpi xmlns:a14="http://schemas.microsoft.com/office/drawing/2010/main" val="0"/>
+              </a:ext>
+            </a:extLst>
+          </a:blip>
+          <a:srcRect l="47266" t="8314" b="25167"/>
+          <a:stretch/>
         </p:blipFill>
         <p:spPr bwMode="auto">
           <a:xfrm>
-            <a:off x="228600" y="152400"/>
-            <a:ext cx="8153400" cy="6400800"/>
+            <a:off x="4217884" y="1676400"/>
+            <a:ext cx="4505906" cy="4267200"/>
           </a:xfrm>
           <a:prstGeom prst="rect">
             <a:avLst/>
@@ -4318,6 +5030,55 @@
           </a:extLst>
         </p:spPr>
       </p:pic>
+      <p:sp>
+        <p:nvSpPr>
+          <p:cNvPr id="3" name="Content Placeholder 2">
+            <a:extLst>
+              <a:ext uri="{FF2B5EF4-FFF2-40B4-BE49-F238E27FC236}">
+                <a16:creationId xmlns:a16="http://schemas.microsoft.com/office/drawing/2014/main" id="{AFE0B753-9DB7-43C8-A2C6-E04943F3831D}"/>
+              </a:ext>
+            </a:extLst>
+          </p:cNvPr>
+          <p:cNvSpPr>
+            <a:spLocks noGrp="1"/>
+          </p:cNvSpPr>
+          <p:nvPr>
+            <p:ph sz="half" idx="2"/>
+          </p:nvPr>
+        </p:nvSpPr>
+        <p:spPr>
+          <a:xfrm>
+            <a:off x="685800" y="2362200"/>
+            <a:ext cx="2819400" cy="2895599"/>
+          </a:xfrm>
+        </p:spPr>
+        <p:txBody>
+          <a:bodyPr>
+            <a:normAutofit fontScale="92500" lnSpcReduction="10000"/>
+          </a:bodyPr>
+          <a:lstStyle/>
+          <a:p>
+            <a:r>
+              <a:rPr lang="en-IN" dirty="0"/>
+              <a:t>Several routers attached to it. </a:t>
+            </a:r>
+          </a:p>
+          <a:p>
+            <a:pPr algn="just"/>
+            <a:r>
+              <a:rPr lang="en-IN" dirty="0"/>
+              <a:t>Data can enter or leave through any router. </a:t>
+            </a:r>
+          </a:p>
+          <a:p>
+            <a:pPr algn="just"/>
+            <a:r>
+              <a:rPr lang="en-IN" dirty="0"/>
+              <a:t>Each router has many neighbors. </a:t>
+            </a:r>
+          </a:p>
+        </p:txBody>
+      </p:sp>
     </p:spTree>
     <p:extLst>
       <p:ext uri="{BB962C8B-B14F-4D97-AF65-F5344CB8AC3E}">
@@ -4331,7 +5092,7 @@
 </p:sld>
 </file>
 
-<file path=ppt/slides/slide21.xml><?xml version="1.0" encoding="utf-8"?>
+<file path=ppt/slides/slide22.xml><?xml version="1.0" encoding="utf-8"?>
 <p:sld xmlns:a="http://schemas.openxmlformats.org/drawingml/2006/main" xmlns:r="http://schemas.openxmlformats.org/officeDocument/2006/relationships" xmlns:p="http://schemas.openxmlformats.org/presentationml/2006/main">
   <p:cSld>
     <p:spTree>
@@ -4348,6 +5109,38 @@
           <a:chExt cx="0" cy="0"/>
         </a:xfrm>
       </p:grpSpPr>
+      <p:sp>
+        <p:nvSpPr>
+          <p:cNvPr id="2" name="Title 1">
+            <a:extLst>
+              <a:ext uri="{FF2B5EF4-FFF2-40B4-BE49-F238E27FC236}">
+                <a16:creationId xmlns:a16="http://schemas.microsoft.com/office/drawing/2014/main" id="{6ABA1035-59D1-4AFC-808A-8F5D7BE7CBCB}"/>
+              </a:ext>
+            </a:extLst>
+          </p:cNvPr>
+          <p:cNvSpPr>
+            <a:spLocks noGrp="1"/>
+          </p:cNvSpPr>
+          <p:nvPr>
+            <p:ph type="title"/>
+          </p:nvPr>
+        </p:nvSpPr>
+        <p:spPr/>
+        <p:txBody>
+          <a:bodyPr/>
+          <a:lstStyle/>
+          <a:p>
+            <a:r>
+              <a:rPr lang="en-IN" dirty="0">
+                <a:solidFill>
+                  <a:srgbClr val="002060"/>
+                </a:solidFill>
+              </a:rPr>
+              <a:t>Stub Link</a:t>
+            </a:r>
+          </a:p>
+        </p:txBody>
+      </p:sp>
       <p:pic>
         <p:nvPicPr>
           <p:cNvPr id="12290" name="Picture 2"/>
@@ -4355,10 +5148,10 @@
             <a:picLocks noGrp="1" noChangeAspect="1" noChangeArrowheads="1"/>
           </p:cNvPicPr>
           <p:nvPr>
-            <p:ph idx="1"/>
+            <p:ph sz="half" idx="1"/>
           </p:nvPr>
         </p:nvPicPr>
-        <p:blipFill>
+        <p:blipFill rotWithShape="1">
           <a:blip r:embed="rId2">
             <a:extLst>
               <a:ext uri="{28A0092B-C50C-407E-A947-70E740481C1C}">
@@ -4366,15 +5159,13 @@
               </a:ext>
             </a:extLst>
           </a:blip>
-          <a:srcRect/>
-          <a:stretch>
-            <a:fillRect/>
-          </a:stretch>
+          <a:srcRect l="12195" t="57902" r="18293" b="17281"/>
+          <a:stretch/>
         </p:blipFill>
         <p:spPr bwMode="auto">
           <a:xfrm>
-            <a:off x="304800" y="76200"/>
-            <a:ext cx="8534400" cy="6705600"/>
+            <a:off x="1409700" y="3722703"/>
+            <a:ext cx="6324600" cy="1695253"/>
           </a:xfrm>
           <a:prstGeom prst="rect">
             <a:avLst/>
@@ -4404,6 +5195,53 @@
           </a:extLst>
         </p:spPr>
       </p:pic>
+      <p:sp>
+        <p:nvSpPr>
+          <p:cNvPr id="3" name="Content Placeholder 2">
+            <a:extLst>
+              <a:ext uri="{FF2B5EF4-FFF2-40B4-BE49-F238E27FC236}">
+                <a16:creationId xmlns:a16="http://schemas.microsoft.com/office/drawing/2014/main" id="{7042BB8B-4ECA-4451-A93D-F32517DB6DCC}"/>
+              </a:ext>
+            </a:extLst>
+          </p:cNvPr>
+          <p:cNvSpPr>
+            <a:spLocks noGrp="1"/>
+          </p:cNvSpPr>
+          <p:nvPr>
+            <p:ph sz="half" idx="2"/>
+          </p:nvPr>
+        </p:nvSpPr>
+        <p:spPr>
+          <a:xfrm>
+            <a:off x="533400" y="1600201"/>
+            <a:ext cx="8153400" cy="1524000"/>
+          </a:xfrm>
+        </p:spPr>
+        <p:txBody>
+          <a:bodyPr>
+            <a:normAutofit lnSpcReduction="10000"/>
+          </a:bodyPr>
+          <a:lstStyle/>
+          <a:p>
+            <a:r>
+              <a:rPr lang="en-IN" dirty="0"/>
+              <a:t>Connected to only 1 router. </a:t>
+            </a:r>
+          </a:p>
+          <a:p>
+            <a:r>
+              <a:rPr lang="en-IN" dirty="0"/>
+              <a:t>Data enters and leaves through this single router. </a:t>
+            </a:r>
+          </a:p>
+          <a:p>
+            <a:r>
+              <a:rPr lang="en-IN" dirty="0"/>
+              <a:t>Only 1 direction. </a:t>
+            </a:r>
+          </a:p>
+        </p:txBody>
+      </p:sp>
     </p:spTree>
     <p:extLst>
       <p:ext uri="{BB962C8B-B14F-4D97-AF65-F5344CB8AC3E}">
@@ -4417,7 +5255,7 @@
 </p:sld>
 </file>
 
-<file path=ppt/slides/slide22.xml><?xml version="1.0" encoding="utf-8"?>
+<file path=ppt/slides/slide23.xml><?xml version="1.0" encoding="utf-8"?>
 <p:sld xmlns:a="http://schemas.openxmlformats.org/drawingml/2006/main" xmlns:r="http://schemas.openxmlformats.org/officeDocument/2006/relationships" xmlns:p="http://schemas.openxmlformats.org/presentationml/2006/main">
   <p:cSld>
     <p:spTree>
@@ -4434,62 +5272,85 @@
           <a:chExt cx="0" cy="0"/>
         </a:xfrm>
       </p:grpSpPr>
-      <p:pic>
-        <p:nvPicPr>
-          <p:cNvPr id="13314" name="Picture 2"/>
-          <p:cNvPicPr>
-            <a:picLocks noGrp="1" noChangeAspect="1" noChangeArrowheads="1"/>
-          </p:cNvPicPr>
-          <p:nvPr>
-            <p:ph idx="1"/>
-          </p:nvPr>
-        </p:nvPicPr>
-        <p:blipFill>
-          <a:blip r:embed="rId2">
+      <p:sp>
+        <p:nvSpPr>
+          <p:cNvPr id="2" name="Title 1">
             <a:extLst>
-              <a:ext uri="{28A0092B-C50C-407E-A947-70E740481C1C}">
-                <a14:useLocalDpi xmlns:a14="http://schemas.microsoft.com/office/drawing/2010/main" val="0"/>
+              <a:ext uri="{FF2B5EF4-FFF2-40B4-BE49-F238E27FC236}">
+                <a16:creationId xmlns:a16="http://schemas.microsoft.com/office/drawing/2014/main" id="{F1F4CA2D-97AC-46EB-ABCA-BF89206FADAA}"/>
               </a:ext>
             </a:extLst>
-          </a:blip>
-          <a:srcRect/>
-          <a:stretch>
-            <a:fillRect/>
-          </a:stretch>
-        </p:blipFill>
-        <p:spPr bwMode="auto">
+          </p:cNvPr>
+          <p:cNvSpPr>
+            <a:spLocks noGrp="1"/>
+          </p:cNvSpPr>
+          <p:nvPr>
+            <p:ph type="title"/>
+          </p:nvPr>
+        </p:nvSpPr>
+        <p:spPr/>
+        <p:txBody>
+          <a:bodyPr/>
+          <a:lstStyle/>
+          <a:p>
+            <a:r>
+              <a:rPr lang="en-IN" dirty="0">
+                <a:solidFill>
+                  <a:srgbClr val="002060"/>
+                </a:solidFill>
+              </a:rPr>
+              <a:t>Virtual Link</a:t>
+            </a:r>
+          </a:p>
+        </p:txBody>
+      </p:sp>
+      <p:sp>
+        <p:nvSpPr>
+          <p:cNvPr id="3" name="Content Placeholder 2">
+            <a:extLst>
+              <a:ext uri="{FF2B5EF4-FFF2-40B4-BE49-F238E27FC236}">
+                <a16:creationId xmlns:a16="http://schemas.microsoft.com/office/drawing/2014/main" id="{19C7E5C6-0D42-4F60-A790-1F6C55F2A116}"/>
+              </a:ext>
+            </a:extLst>
+          </p:cNvPr>
+          <p:cNvSpPr>
+            <a:spLocks noGrp="1"/>
+          </p:cNvSpPr>
+          <p:nvPr>
+            <p:ph idx="1"/>
+          </p:nvPr>
+        </p:nvSpPr>
+        <p:spPr>
           <a:xfrm>
-            <a:off x="228600" y="228600"/>
-            <a:ext cx="8382000" cy="5897563"/>
+            <a:off x="457200" y="1600201"/>
+            <a:ext cx="8001000" cy="2057400"/>
           </a:xfrm>
-          <a:prstGeom prst="rect">
-            <a:avLst/>
-          </a:prstGeom>
-          <a:noFill/>
-          <a:ln>
-            <a:noFill/>
-          </a:ln>
-          <a:extLst>
-            <a:ext uri="{909E8E84-426E-40DD-AFC4-6F175D3DCCD1}">
-              <a14:hiddenFill xmlns:a14="http://schemas.microsoft.com/office/drawing/2010/main">
-                <a:solidFill>
-                  <a:schemeClr val="accent1"/>
-                </a:solidFill>
-              </a14:hiddenFill>
-            </a:ext>
-            <a:ext uri="{91240B29-F687-4F45-9708-019B960494DF}">
-              <a14:hiddenLine xmlns:a14="http://schemas.microsoft.com/office/drawing/2010/main" w="9525">
-                <a:solidFill>
-                  <a:schemeClr val="tx1"/>
-                </a:solidFill>
-                <a:miter lim="800000"/>
-                <a:headEnd/>
-                <a:tailEnd/>
-              </a14:hiddenLine>
-            </a:ext>
-          </a:extLst>
         </p:spPr>
-      </p:pic>
+        <p:txBody>
+          <a:bodyPr/>
+          <a:lstStyle/>
+          <a:p>
+            <a:r>
+              <a:rPr lang="en-IN" dirty="0"/>
+              <a:t>When link between 2 routers are broken, the administrator creates a virtual link between them. </a:t>
+            </a:r>
+          </a:p>
+          <a:p>
+            <a:r>
+              <a:rPr lang="en-IN" dirty="0"/>
+              <a:t>Using </a:t>
+            </a:r>
+            <a:r>
+              <a:rPr lang="en-IN" b="1" dirty="0"/>
+              <a:t>a longer path</a:t>
+            </a:r>
+            <a:r>
+              <a:rPr lang="en-IN" dirty="0"/>
+              <a:t>, which passes through several routers. </a:t>
+            </a:r>
+          </a:p>
+        </p:txBody>
+      </p:sp>
     </p:spTree>
     <p:extLst>
       <p:ext uri="{BB962C8B-B14F-4D97-AF65-F5344CB8AC3E}">
@@ -4503,7 +5364,7 @@
 </p:sld>
 </file>
 
-<file path=ppt/slides/slide23.xml><?xml version="1.0" encoding="utf-8"?>
+<file path=ppt/slides/slide24.xml><?xml version="1.0" encoding="utf-8"?>
 <p:sld xmlns:a="http://schemas.openxmlformats.org/drawingml/2006/main" xmlns:r="http://schemas.openxmlformats.org/officeDocument/2006/relationships" xmlns:p="http://schemas.openxmlformats.org/presentationml/2006/main">
   <p:cSld>
     <p:spTree>
@@ -4613,7 +5474,7 @@
 </p:sld>
 </file>
 
-<file path=ppt/slides/slide24.xml><?xml version="1.0" encoding="utf-8"?>
+<file path=ppt/slides/slide25.xml><?xml version="1.0" encoding="utf-8"?>
 <p:sld xmlns:a="http://schemas.openxmlformats.org/drawingml/2006/main" xmlns:r="http://schemas.openxmlformats.org/officeDocument/2006/relationships" xmlns:p="http://schemas.openxmlformats.org/presentationml/2006/main">
   <p:cSld>
     <p:spTree>
@@ -4630,6 +5491,36 @@
           <a:chExt cx="0" cy="0"/>
         </a:xfrm>
       </p:grpSpPr>
+      <p:sp>
+        <p:nvSpPr>
+          <p:cNvPr id="2" name="Title 1">
+            <a:extLst>
+              <a:ext uri="{FF2B5EF4-FFF2-40B4-BE49-F238E27FC236}">
+                <a16:creationId xmlns:a16="http://schemas.microsoft.com/office/drawing/2014/main" id="{56793596-3197-48F6-9351-405D3CDC54B9}"/>
+              </a:ext>
+            </a:extLst>
+          </p:cNvPr>
+          <p:cNvSpPr>
+            <a:spLocks noGrp="1"/>
+          </p:cNvSpPr>
+          <p:nvPr>
+            <p:ph type="title"/>
+          </p:nvPr>
+        </p:nvSpPr>
+        <p:spPr/>
+        <p:txBody>
+          <a:bodyPr>
+            <a:normAutofit/>
+          </a:bodyPr>
+          <a:lstStyle/>
+          <a:p>
+            <a:r>
+              <a:rPr lang="en-IN" dirty="0"/>
+              <a:t>OSPF Packets</a:t>
+            </a:r>
+          </a:p>
+        </p:txBody>
+      </p:sp>
       <p:pic>
         <p:nvPicPr>
           <p:cNvPr id="15362" name="Picture 2"/>
@@ -4637,10 +5528,10 @@
             <a:picLocks noGrp="1" noChangeAspect="1" noChangeArrowheads="1"/>
           </p:cNvPicPr>
           <p:nvPr>
-            <p:ph idx="1"/>
+            <p:ph sz="half" idx="1"/>
           </p:nvPr>
         </p:nvPicPr>
-        <p:blipFill>
+        <p:blipFill rotWithShape="1">
           <a:blip r:embed="rId2">
             <a:extLst>
               <a:ext uri="{28A0092B-C50C-407E-A947-70E740481C1C}">
@@ -4648,15 +5539,13 @@
               </a:ext>
             </a:extLst>
           </a:blip>
-          <a:srcRect/>
-          <a:stretch>
-            <a:fillRect/>
-          </a:stretch>
+          <a:srcRect l="8022" t="51098" r="3143"/>
+          <a:stretch/>
         </p:blipFill>
         <p:spPr bwMode="auto">
           <a:xfrm>
-            <a:off x="228600" y="685800"/>
-            <a:ext cx="8686800" cy="5440363"/>
+            <a:off x="2057400" y="3200400"/>
+            <a:ext cx="6629400" cy="2986765"/>
           </a:xfrm>
           <a:prstGeom prst="rect">
             <a:avLst/>
@@ -4686,6 +5575,76 @@
           </a:extLst>
         </p:spPr>
       </p:pic>
+      <p:sp>
+        <p:nvSpPr>
+          <p:cNvPr id="3" name="Content Placeholder 2">
+            <a:extLst>
+              <a:ext uri="{FF2B5EF4-FFF2-40B4-BE49-F238E27FC236}">
+                <a16:creationId xmlns:a16="http://schemas.microsoft.com/office/drawing/2014/main" id="{2A00BFB9-F909-4A21-9F06-191A93143EAE}"/>
+              </a:ext>
+            </a:extLst>
+          </p:cNvPr>
+          <p:cNvSpPr>
+            <a:spLocks noGrp="1"/>
+          </p:cNvSpPr>
+          <p:nvPr>
+            <p:ph sz="half" idx="2"/>
+          </p:nvPr>
+        </p:nvSpPr>
+        <p:spPr>
+          <a:xfrm>
+            <a:off x="457200" y="1524000"/>
+            <a:ext cx="5486400" cy="2362200"/>
+          </a:xfrm>
+        </p:spPr>
+        <p:txBody>
+          <a:bodyPr>
+            <a:normAutofit fontScale="92500" lnSpcReduction="10000"/>
+          </a:bodyPr>
+          <a:lstStyle/>
+          <a:p>
+            <a:r>
+              <a:rPr lang="en-IN" dirty="0"/>
+              <a:t>It uses 5 different packets: </a:t>
+            </a:r>
+          </a:p>
+          <a:p>
+            <a:pPr lvl="1"/>
+            <a:r>
+              <a:rPr lang="en-IN" dirty="0"/>
+              <a:t>Hello</a:t>
+            </a:r>
+          </a:p>
+          <a:p>
+            <a:pPr lvl="1"/>
+            <a:r>
+              <a:rPr lang="en-IN" dirty="0"/>
+              <a:t>Database description</a:t>
+            </a:r>
+          </a:p>
+          <a:p>
+            <a:pPr lvl="1"/>
+            <a:r>
+              <a:rPr lang="en-IN" dirty="0"/>
+              <a:t>Link state request</a:t>
+            </a:r>
+          </a:p>
+          <a:p>
+            <a:pPr lvl="1"/>
+            <a:r>
+              <a:rPr lang="en-IN" dirty="0"/>
+              <a:t>Link state update</a:t>
+            </a:r>
+          </a:p>
+          <a:p>
+            <a:pPr lvl="1"/>
+            <a:r>
+              <a:rPr lang="en-IN" dirty="0"/>
+              <a:t>Link state acknowledgement</a:t>
+            </a:r>
+          </a:p>
+        </p:txBody>
+      </p:sp>
     </p:spTree>
     <p:extLst>
       <p:ext uri="{BB962C8B-B14F-4D97-AF65-F5344CB8AC3E}">
@@ -4699,7 +5658,7 @@
 </p:sld>
 </file>
 
-<file path=ppt/slides/slide25.xml><?xml version="1.0" encoding="utf-8"?>
+<file path=ppt/slides/slide26.xml><?xml version="1.0" encoding="utf-8"?>
 <p:sld xmlns:a="http://schemas.openxmlformats.org/drawingml/2006/main" xmlns:r="http://schemas.openxmlformats.org/officeDocument/2006/relationships" xmlns:p="http://schemas.openxmlformats.org/presentationml/2006/main">
   <p:cSld>
     <p:spTree>
@@ -4716,25 +5675,6 @@
           <a:chExt cx="0" cy="0"/>
         </a:xfrm>
       </p:grpSpPr>
-      <p:sp>
-        <p:nvSpPr>
-          <p:cNvPr id="2" name="Title 1"/>
-          <p:cNvSpPr>
-            <a:spLocks noGrp="1"/>
-          </p:cNvSpPr>
-          <p:nvPr>
-            <p:ph type="title"/>
-          </p:nvPr>
-        </p:nvSpPr>
-        <p:spPr/>
-        <p:txBody>
-          <a:bodyPr/>
-          <a:lstStyle/>
-          <a:p>
-            <a:endParaRPr lang="en-US"/>
-          </a:p>
-        </p:txBody>
-      </p:sp>
       <p:pic>
         <p:nvPicPr>
           <p:cNvPr id="16386" name="Picture 2"/>
@@ -4742,10 +5682,10 @@
             <a:picLocks noGrp="1" noChangeAspect="1" noChangeArrowheads="1"/>
           </p:cNvPicPr>
           <p:nvPr>
-            <p:ph idx="1"/>
+            <p:ph idx="4294967295"/>
           </p:nvPr>
         </p:nvPicPr>
-        <p:blipFill>
+        <p:blipFill rotWithShape="1">
           <a:blip r:embed="rId2">
             <a:extLst>
               <a:ext uri="{28A0092B-C50C-407E-A947-70E740481C1C}">
@@ -4753,15 +5693,13 @@
               </a:ext>
             </a:extLst>
           </a:blip>
-          <a:srcRect/>
-          <a:stretch>
-            <a:fillRect/>
-          </a:stretch>
+          <a:srcRect t="4445" b="5556"/>
+          <a:stretch/>
         </p:blipFill>
         <p:spPr bwMode="auto">
           <a:xfrm>
-            <a:off x="0" y="0"/>
-            <a:ext cx="9144000" cy="6858000"/>
+            <a:off x="0" y="342900"/>
+            <a:ext cx="9144000" cy="6172200"/>
           </a:xfrm>
           <a:prstGeom prst="rect">
             <a:avLst/>
@@ -4804,7 +5742,7 @@
 </p:sld>
 </file>
 
-<file path=ppt/slides/slide26.xml><?xml version="1.0" encoding="utf-8"?>
+<file path=ppt/slides/slide27.xml><?xml version="1.0" encoding="utf-8"?>
 <p:sld xmlns:a="http://schemas.openxmlformats.org/drawingml/2006/main" xmlns:r="http://schemas.openxmlformats.org/officeDocument/2006/relationships" xmlns:p="http://schemas.openxmlformats.org/presentationml/2006/main">
   <p:cSld>
     <p:spTree>
@@ -5358,7 +6296,7 @@
           <a:p>
             <a:r>
               <a:rPr lang="en-US" dirty="0"/>
-              <a:t>Like node id, the list of links, a sequence number, age</a:t>
+              <a:t>Like node id, the list of links, a sequence number, age. </a:t>
             </a:r>
           </a:p>
           <a:p>
@@ -5400,14 +6338,14 @@
             <a:pPr lvl="1"/>
             <a:r>
               <a:rPr lang="en-US" dirty="0"/>
-              <a:t>When there is a change in the topology of the domain</a:t>
+              <a:t>When there is a change in the topology of the domain. </a:t>
             </a:r>
           </a:p>
           <a:p>
             <a:pPr lvl="1"/>
             <a:r>
               <a:rPr lang="en-US" dirty="0"/>
-              <a:t>On a periodic basis</a:t>
+              <a:t>On a periodic basis. </a:t>
             </a:r>
           </a:p>
           <a:p>
@@ -5501,24 +6439,24 @@
           <a:lstStyle/>
           <a:p>
             <a:r>
-              <a:rPr lang="en-US" dirty="0"/>
+              <a:rPr lang="en-US" sz="2600" dirty="0"/>
               <a:t>After a node has prepared an LSP, it must be disseminated to all other nodes, not only its neighbors. The process is called </a:t>
             </a:r>
             <a:r>
-              <a:rPr lang="en-US" i="1" dirty="0">
+              <a:rPr lang="en-US" sz="2600" i="1" dirty="0">
                 <a:latin typeface="Garamond" panose="02020404030301010803" pitchFamily="18" charset="0"/>
               </a:rPr>
               <a:t>flooding</a:t>
             </a:r>
             <a:r>
-              <a:rPr lang="en-US" dirty="0"/>
+              <a:rPr lang="en-US" sz="2600" dirty="0"/>
               <a:t>.</a:t>
             </a:r>
           </a:p>
           <a:p>
             <a:r>
-              <a:rPr lang="en-US" dirty="0"/>
-              <a:t>Steps</a:t>
+              <a:rPr lang="en-US" sz="2600" dirty="0"/>
+              <a:t>Steps:</a:t>
             </a:r>
           </a:p>
           <a:p>
@@ -5532,14 +6470,21 @@
             <a:pPr lvl="1"/>
             <a:r>
               <a:rPr lang="en-US" dirty="0"/>
-              <a:t>A node that receives an LSP compares it with the copy it may already have, if arrived LSP older than the one it has (by checking the sequence no), it discard the packet. </a:t>
+              <a:t>A node that receives an LSP compares it with the copy it may already have. </a:t>
             </a:r>
           </a:p>
           <a:p>
             <a:pPr lvl="1"/>
             <a:r>
               <a:rPr lang="en-US" dirty="0"/>
-              <a:t>If it is newer.</a:t>
+              <a:t>If arrived LSP is older than the one it has (by checking the sequence no), it discards the packet. </a:t>
+            </a:r>
+          </a:p>
+          <a:p>
+            <a:pPr lvl="1"/>
+            <a:r>
+              <a:rPr lang="en-US" dirty="0"/>
+              <a:t>If it is newer: </a:t>
             </a:r>
           </a:p>
           <a:p>
@@ -5553,7 +6498,7 @@
             <a:pPr lvl="2"/>
             <a:r>
               <a:rPr lang="en-US" sz="2200" dirty="0"/>
-              <a:t>It sends a copy of it out of each interface except the one from which the packet arrived.</a:t>
+              <a:t>It sends a copy of it out of each interface except the one from which the packet arrived. </a:t>
             </a:r>
           </a:p>
         </p:txBody>
@@ -5628,8 +6573,8 @@
         </p:nvSpPr>
         <p:spPr>
           <a:xfrm>
-            <a:off x="0" y="1371600"/>
-            <a:ext cx="9144000" cy="5390707"/>
+            <a:off x="0" y="1524000"/>
+            <a:ext cx="8915400" cy="5238307"/>
           </a:xfrm>
         </p:spPr>
         <p:txBody>
@@ -5639,67 +6584,55 @@
           <a:lstStyle/>
           <a:p>
             <a:r>
-              <a:rPr lang="en-US" dirty="0"/>
+              <a:rPr lang="en-US" sz="2700" dirty="0"/>
               <a:t>After receiving all LSPs, each node will have a copy of the whole topology.</a:t>
             </a:r>
           </a:p>
           <a:p>
             <a:r>
-              <a:rPr lang="en-US" dirty="0"/>
+              <a:rPr lang="en-US" sz="2700" dirty="0"/>
               <a:t>This is not sufficient to find the shortest path to every other node.</a:t>
             </a:r>
           </a:p>
           <a:p>
             <a:r>
-              <a:rPr lang="en-US" dirty="0"/>
+              <a:rPr lang="en-US" sz="2700" dirty="0"/>
               <a:t>A shortest path tree is needed.</a:t>
             </a:r>
           </a:p>
           <a:p>
             <a:r>
-              <a:rPr lang="en-US" dirty="0"/>
+              <a:rPr lang="en-US" sz="2700" dirty="0"/>
               <a:t>The Dijkstra’s algorithm creates a shortest path tree from a graph.</a:t>
             </a:r>
           </a:p>
           <a:p>
             <a:r>
-              <a:rPr lang="en-US" dirty="0"/>
+              <a:rPr lang="en-US" sz="2700" dirty="0"/>
               <a:t>The algorithm divides the node into two sets: </a:t>
             </a:r>
             <a:r>
-              <a:rPr lang="en-US" b="1" dirty="0"/>
+              <a:rPr lang="en-US" sz="2700" b="1" dirty="0"/>
               <a:t>tentative</a:t>
             </a:r>
             <a:r>
-              <a:rPr lang="en-US" dirty="0"/>
+              <a:rPr lang="en-US" sz="2700" dirty="0"/>
               <a:t> and </a:t>
             </a:r>
             <a:r>
-              <a:rPr lang="en-US" b="1" dirty="0"/>
+              <a:rPr lang="en-US" sz="2700" b="1" dirty="0"/>
               <a:t>permanent</a:t>
             </a:r>
             <a:r>
-              <a:rPr lang="en-US" dirty="0"/>
+              <a:rPr lang="en-US" sz="2700" dirty="0"/>
               <a:t>.</a:t>
             </a:r>
           </a:p>
           <a:p>
             <a:r>
-              <a:rPr lang="en-US" dirty="0"/>
-              <a:t>It finds the neighbors of a current node ,makes them tentative, examine them if passes criteria, make them permanent.</a:t>
-            </a:r>
-          </a:p>
-          <a:p>
-            <a:endParaRPr lang="en-US" dirty="0"/>
-          </a:p>
-          <a:p>
-            <a:endParaRPr lang="en-US" dirty="0"/>
-          </a:p>
-          <a:p>
-            <a:pPr marL="0" indent="0">
-              <a:buNone/>
-            </a:pPr>
-            <a:endParaRPr lang="en-US" dirty="0"/>
+              <a:rPr lang="en-US" sz="2700" dirty="0"/>
+              <a:t>It finds the neighbors of a current node, makes them tentative, examines them, if passes criteria - makes them permanent. </a:t>
+            </a:r>
           </a:p>
         </p:txBody>
       </p:sp>
@@ -5997,4 +6930,299 @@
   <a:objectDefaults/>
   <a:extraClrSchemeLst/>
 </a:theme>
+</file>
+
+<file path=ppt/theme/theme2.xml><?xml version="1.0" encoding="utf-8"?>
+<a:theme xmlns:a="http://schemas.openxmlformats.org/drawingml/2006/main" name="Office Theme">
+  <a:themeElements>
+    <a:clrScheme name="Office">
+      <a:dk1>
+        <a:sysClr val="windowText" lastClr="000000"/>
+      </a:dk1>
+      <a:lt1>
+        <a:sysClr val="window" lastClr="FFFFFF"/>
+      </a:lt1>
+      <a:dk2>
+        <a:srgbClr val="44546A"/>
+      </a:dk2>
+      <a:lt2>
+        <a:srgbClr val="E7E6E6"/>
+      </a:lt2>
+      <a:accent1>
+        <a:srgbClr val="4472C4"/>
+      </a:accent1>
+      <a:accent2>
+        <a:srgbClr val="ED7D31"/>
+      </a:accent2>
+      <a:accent3>
+        <a:srgbClr val="A5A5A5"/>
+      </a:accent3>
+      <a:accent4>
+        <a:srgbClr val="FFC000"/>
+      </a:accent4>
+      <a:accent5>
+        <a:srgbClr val="5B9BD5"/>
+      </a:accent5>
+      <a:accent6>
+        <a:srgbClr val="70AD47"/>
+      </a:accent6>
+      <a:hlink>
+        <a:srgbClr val="0563C1"/>
+      </a:hlink>
+      <a:folHlink>
+        <a:srgbClr val="954F72"/>
+      </a:folHlink>
+    </a:clrScheme>
+    <a:fontScheme name="Office">
+      <a:majorFont>
+        <a:latin typeface="Calibri Light" panose="020F0302020204030204"/>
+        <a:ea typeface=""/>
+        <a:cs typeface=""/>
+        <a:font script="Jpan" typeface="游ゴシック Light"/>
+        <a:font script="Hang" typeface="맑은 고딕"/>
+        <a:font script="Hans" typeface="等线 Light"/>
+        <a:font script="Hant" typeface="新細明體"/>
+        <a:font script="Arab" typeface="Times New Roman"/>
+        <a:font script="Hebr" typeface="Times New Roman"/>
+        <a:font script="Thai" typeface="Angsana New"/>
+        <a:font script="Ethi" typeface="Nyala"/>
+        <a:font script="Beng" typeface="Vrinda"/>
+        <a:font script="Gujr" typeface="Shruti"/>
+        <a:font script="Khmr" typeface="MoolBoran"/>
+        <a:font script="Knda" typeface="Tunga"/>
+        <a:font script="Guru" typeface="Raavi"/>
+        <a:font script="Cans" typeface="Euphemia"/>
+        <a:font script="Cher" typeface="Plantagenet Cherokee"/>
+        <a:font script="Yiii" typeface="Microsoft Yi Baiti"/>
+        <a:font script="Tibt" typeface="Microsoft Himalaya"/>
+        <a:font script="Thaa" typeface="MV Boli"/>
+        <a:font script="Deva" typeface="Mangal"/>
+        <a:font script="Telu" typeface="Gautami"/>
+        <a:font script="Taml" typeface="Latha"/>
+        <a:font script="Syrc" typeface="Estrangelo Edessa"/>
+        <a:font script="Orya" typeface="Kalinga"/>
+        <a:font script="Mlym" typeface="Kartika"/>
+        <a:font script="Laoo" typeface="DokChampa"/>
+        <a:font script="Sinh" typeface="Iskoola Pota"/>
+        <a:font script="Mong" typeface="Mongolian Baiti"/>
+        <a:font script="Viet" typeface="Times New Roman"/>
+        <a:font script="Uigh" typeface="Microsoft Uighur"/>
+        <a:font script="Geor" typeface="Sylfaen"/>
+        <a:font script="Armn" typeface="Arial"/>
+        <a:font script="Bugi" typeface="Leelawadee UI"/>
+        <a:font script="Bopo" typeface="Microsoft JhengHei"/>
+        <a:font script="Java" typeface="Javanese Text"/>
+        <a:font script="Lisu" typeface="Segoe UI"/>
+        <a:font script="Mymr" typeface="Myanmar Text"/>
+        <a:font script="Nkoo" typeface="Ebrima"/>
+        <a:font script="Olck" typeface="Nirmala UI"/>
+        <a:font script="Osma" typeface="Ebrima"/>
+        <a:font script="Phag" typeface="Phagspa"/>
+        <a:font script="Syrn" typeface="Estrangelo Edessa"/>
+        <a:font script="Syrj" typeface="Estrangelo Edessa"/>
+        <a:font script="Syre" typeface="Estrangelo Edessa"/>
+        <a:font script="Sora" typeface="Nirmala UI"/>
+        <a:font script="Tale" typeface="Microsoft Tai Le"/>
+        <a:font script="Talu" typeface="Microsoft New Tai Lue"/>
+        <a:font script="Tfng" typeface="Ebrima"/>
+      </a:majorFont>
+      <a:minorFont>
+        <a:latin typeface="Calibri" panose="020F0502020204030204"/>
+        <a:ea typeface=""/>
+        <a:cs typeface=""/>
+        <a:font script="Jpan" typeface="游ゴシック"/>
+        <a:font script="Hang" typeface="맑은 고딕"/>
+        <a:font script="Hans" typeface="等线"/>
+        <a:font script="Hant" typeface="新細明體"/>
+        <a:font script="Arab" typeface="Arial"/>
+        <a:font script="Hebr" typeface="Arial"/>
+        <a:font script="Thai" typeface="Cordia New"/>
+        <a:font script="Ethi" typeface="Nyala"/>
+        <a:font script="Beng" typeface="Vrinda"/>
+        <a:font script="Gujr" typeface="Shruti"/>
+        <a:font script="Khmr" typeface="DaunPenh"/>
+        <a:font script="Knda" typeface="Tunga"/>
+        <a:font script="Guru" typeface="Raavi"/>
+        <a:font script="Cans" typeface="Euphemia"/>
+        <a:font script="Cher" typeface="Plantagenet Cherokee"/>
+        <a:font script="Yiii" typeface="Microsoft Yi Baiti"/>
+        <a:font script="Tibt" typeface="Microsoft Himalaya"/>
+        <a:font script="Thaa" typeface="MV Boli"/>
+        <a:font script="Deva" typeface="Mangal"/>
+        <a:font script="Telu" typeface="Gautami"/>
+        <a:font script="Taml" typeface="Latha"/>
+        <a:font script="Syrc" typeface="Estrangelo Edessa"/>
+        <a:font script="Orya" typeface="Kalinga"/>
+        <a:font script="Mlym" typeface="Kartika"/>
+        <a:font script="Laoo" typeface="DokChampa"/>
+        <a:font script="Sinh" typeface="Iskoola Pota"/>
+        <a:font script="Mong" typeface="Mongolian Baiti"/>
+        <a:font script="Viet" typeface="Arial"/>
+        <a:font script="Uigh" typeface="Microsoft Uighur"/>
+        <a:font script="Geor" typeface="Sylfaen"/>
+        <a:font script="Armn" typeface="Arial"/>
+        <a:font script="Bugi" typeface="Leelawadee UI"/>
+        <a:font script="Bopo" typeface="Microsoft JhengHei"/>
+        <a:font script="Java" typeface="Javanese Text"/>
+        <a:font script="Lisu" typeface="Segoe UI"/>
+        <a:font script="Mymr" typeface="Myanmar Text"/>
+        <a:font script="Nkoo" typeface="Ebrima"/>
+        <a:font script="Olck" typeface="Nirmala UI"/>
+        <a:font script="Osma" typeface="Ebrima"/>
+        <a:font script="Phag" typeface="Phagspa"/>
+        <a:font script="Syrn" typeface="Estrangelo Edessa"/>
+        <a:font script="Syrj" typeface="Estrangelo Edessa"/>
+        <a:font script="Syre" typeface="Estrangelo Edessa"/>
+        <a:font script="Sora" typeface="Nirmala UI"/>
+        <a:font script="Tale" typeface="Microsoft Tai Le"/>
+        <a:font script="Talu" typeface="Microsoft New Tai Lue"/>
+        <a:font script="Tfng" typeface="Ebrima"/>
+      </a:minorFont>
+    </a:fontScheme>
+    <a:fmtScheme name="Office">
+      <a:fillStyleLst>
+        <a:solidFill>
+          <a:schemeClr val="phClr"/>
+        </a:solidFill>
+        <a:gradFill rotWithShape="1">
+          <a:gsLst>
+            <a:gs pos="0">
+              <a:schemeClr val="phClr">
+                <a:lumMod val="110000"/>
+                <a:satMod val="105000"/>
+                <a:tint val="67000"/>
+              </a:schemeClr>
+            </a:gs>
+            <a:gs pos="50000">
+              <a:schemeClr val="phClr">
+                <a:lumMod val="105000"/>
+                <a:satMod val="103000"/>
+                <a:tint val="73000"/>
+              </a:schemeClr>
+            </a:gs>
+            <a:gs pos="100000">
+              <a:schemeClr val="phClr">
+                <a:lumMod val="105000"/>
+                <a:satMod val="109000"/>
+                <a:tint val="81000"/>
+              </a:schemeClr>
+            </a:gs>
+          </a:gsLst>
+          <a:lin ang="5400000" scaled="0"/>
+        </a:gradFill>
+        <a:gradFill rotWithShape="1">
+          <a:gsLst>
+            <a:gs pos="0">
+              <a:schemeClr val="phClr">
+                <a:satMod val="103000"/>
+                <a:lumMod val="102000"/>
+                <a:tint val="94000"/>
+              </a:schemeClr>
+            </a:gs>
+            <a:gs pos="50000">
+              <a:schemeClr val="phClr">
+                <a:satMod val="110000"/>
+                <a:lumMod val="100000"/>
+                <a:shade val="100000"/>
+              </a:schemeClr>
+            </a:gs>
+            <a:gs pos="100000">
+              <a:schemeClr val="phClr">
+                <a:lumMod val="99000"/>
+                <a:satMod val="120000"/>
+                <a:shade val="78000"/>
+              </a:schemeClr>
+            </a:gs>
+          </a:gsLst>
+          <a:lin ang="5400000" scaled="0"/>
+        </a:gradFill>
+      </a:fillStyleLst>
+      <a:lnStyleLst>
+        <a:ln w="6350" cap="flat" cmpd="sng" algn="ctr">
+          <a:solidFill>
+            <a:schemeClr val="phClr"/>
+          </a:solidFill>
+          <a:prstDash val="solid"/>
+          <a:miter lim="800000"/>
+        </a:ln>
+        <a:ln w="12700" cap="flat" cmpd="sng" algn="ctr">
+          <a:solidFill>
+            <a:schemeClr val="phClr"/>
+          </a:solidFill>
+          <a:prstDash val="solid"/>
+          <a:miter lim="800000"/>
+        </a:ln>
+        <a:ln w="19050" cap="flat" cmpd="sng" algn="ctr">
+          <a:solidFill>
+            <a:schemeClr val="phClr"/>
+          </a:solidFill>
+          <a:prstDash val="solid"/>
+          <a:miter lim="800000"/>
+        </a:ln>
+      </a:lnStyleLst>
+      <a:effectStyleLst>
+        <a:effectStyle>
+          <a:effectLst/>
+        </a:effectStyle>
+        <a:effectStyle>
+          <a:effectLst/>
+        </a:effectStyle>
+        <a:effectStyle>
+          <a:effectLst>
+            <a:outerShdw blurRad="57150" dist="19050" dir="5400000" algn="ctr" rotWithShape="0">
+              <a:srgbClr val="000000">
+                <a:alpha val="63000"/>
+              </a:srgbClr>
+            </a:outerShdw>
+          </a:effectLst>
+        </a:effectStyle>
+      </a:effectStyleLst>
+      <a:bgFillStyleLst>
+        <a:solidFill>
+          <a:schemeClr val="phClr"/>
+        </a:solidFill>
+        <a:solidFill>
+          <a:schemeClr val="phClr">
+            <a:tint val="95000"/>
+            <a:satMod val="170000"/>
+          </a:schemeClr>
+        </a:solidFill>
+        <a:gradFill rotWithShape="1">
+          <a:gsLst>
+            <a:gs pos="0">
+              <a:schemeClr val="phClr">
+                <a:tint val="93000"/>
+                <a:satMod val="150000"/>
+                <a:shade val="98000"/>
+                <a:lumMod val="102000"/>
+              </a:schemeClr>
+            </a:gs>
+            <a:gs pos="50000">
+              <a:schemeClr val="phClr">
+                <a:tint val="98000"/>
+                <a:satMod val="130000"/>
+                <a:shade val="90000"/>
+                <a:lumMod val="103000"/>
+              </a:schemeClr>
+            </a:gs>
+            <a:gs pos="100000">
+              <a:schemeClr val="phClr">
+                <a:shade val="63000"/>
+                <a:satMod val="120000"/>
+              </a:schemeClr>
+            </a:gs>
+          </a:gsLst>
+          <a:lin ang="5400000" scaled="0"/>
+        </a:gradFill>
+      </a:bgFillStyleLst>
+    </a:fmtScheme>
+  </a:themeElements>
+  <a:objectDefaults/>
+  <a:extraClrSchemeLst/>
+  <a:extLst>
+    <a:ext uri="{05A4C25C-085E-4340-85A3-A5531E510DB2}">
+      <thm15:themeFamily xmlns:thm15="http://schemas.microsoft.com/office/thememl/2012/main" name="Office Theme" id="{62F939B6-93AF-4DB8-9C6B-D6C7DFDC589F}" vid="{4A3C46E8-61CC-4603-A589-7422A47A8E4A}"/>
+    </a:ext>
+  </a:extLst>
+</a:theme>
 </file>
</xml_diff>